<commit_message>
colored quiver plots wip
</commit_message>
<xml_diff>
--- a/magnetic_lens_monte_carlo/magnetic_lens_jun_18.pptx
+++ b/magnetic_lens_monte_carlo/magnetic_lens_jun_18.pptx
@@ -3449,7 +3449,7 @@
           <a:p>
             <a:r>
               <a:rPr lang="en-US" dirty="0"/>
-              <a:t>Monte Carlo Trajectory Simulation</a:t>
+              <a:t>Monte Carlo Particle Trajectory Simulation</a:t>
             </a:r>
           </a:p>
         </p:txBody>
@@ -3910,7 +3910,7 @@
           <a:p>
             <a:r>
               <a:rPr lang="en-US" dirty="0"/>
-              <a:t>Monte Carlo Trajectory Simulation</a:t>
+              <a:t>Monte Carlo Particle Trajectory Simulation</a:t>
             </a:r>
           </a:p>
         </p:txBody>
@@ -3937,8 +3937,8 @@
         </p:blipFill>
         <p:spPr>
           <a:xfrm>
-            <a:off x="2549740" y="1386788"/>
-            <a:ext cx="7092519" cy="5319390"/>
+            <a:off x="6274675" y="1884007"/>
+            <a:ext cx="5430815" cy="4073112"/>
           </a:xfrm>
           <a:prstGeom prst="rect">
             <a:avLst/>
@@ -3961,8 +3961,8 @@
         </p:nvCxnSpPr>
         <p:spPr>
           <a:xfrm>
-            <a:off x="4309239" y="5339255"/>
-            <a:ext cx="0" cy="790904"/>
+            <a:off x="7626236" y="4908331"/>
+            <a:ext cx="0" cy="601718"/>
           </a:xfrm>
           <a:prstGeom prst="line">
             <a:avLst/>
@@ -4007,8 +4007,8 @@
         </p:nvCxnSpPr>
         <p:spPr>
           <a:xfrm>
-            <a:off x="4330263" y="2016509"/>
-            <a:ext cx="0" cy="852815"/>
+            <a:off x="7626236" y="2363350"/>
+            <a:ext cx="0" cy="590057"/>
           </a:xfrm>
           <a:prstGeom prst="line">
             <a:avLst/>
@@ -4053,8 +4053,8 @@
         </p:nvCxnSpPr>
         <p:spPr>
           <a:xfrm>
-            <a:off x="6064467" y="5896303"/>
-            <a:ext cx="0" cy="233856"/>
+            <a:off x="9003087" y="5318234"/>
+            <a:ext cx="0" cy="191815"/>
           </a:xfrm>
           <a:prstGeom prst="line">
             <a:avLst/>
@@ -4099,8 +4099,8 @@
         </p:nvCxnSpPr>
         <p:spPr>
           <a:xfrm>
-            <a:off x="6085491" y="2016509"/>
-            <a:ext cx="0" cy="295767"/>
+            <a:off x="8967285" y="2362611"/>
+            <a:ext cx="0" cy="186998"/>
           </a:xfrm>
           <a:prstGeom prst="line">
             <a:avLst/>
@@ -4143,7 +4143,7 @@
         </p:nvSpPr>
         <p:spPr>
           <a:xfrm>
-            <a:off x="4351283" y="1968090"/>
+            <a:off x="7630929" y="2362611"/>
             <a:ext cx="1156121" cy="646331"/>
           </a:xfrm>
           <a:prstGeom prst="rect">
@@ -4178,7 +4178,7 @@
         </p:nvSpPr>
         <p:spPr>
           <a:xfrm>
-            <a:off x="7340166" y="3754848"/>
+            <a:off x="10016027" y="3681275"/>
             <a:ext cx="1156121" cy="646331"/>
           </a:xfrm>
           <a:prstGeom prst="rect">
@@ -4215,8 +4215,8 @@
         </p:nvCxnSpPr>
         <p:spPr>
           <a:xfrm>
-            <a:off x="7325712" y="3825766"/>
-            <a:ext cx="0" cy="515006"/>
+            <a:off x="10001573" y="3731174"/>
+            <a:ext cx="0" cy="522862"/>
           </a:xfrm>
           <a:prstGeom prst="line">
             <a:avLst/>
@@ -4256,7 +4256,441 @@
         </p:nvSpPr>
         <p:spPr>
           <a:xfrm>
-            <a:off x="6106510" y="1957580"/>
+            <a:off x="8967285" y="2307076"/>
+            <a:ext cx="1156121" cy="646331"/>
+          </a:xfrm>
+          <a:prstGeom prst="rect">
+            <a:avLst/>
+          </a:prstGeom>
+          <a:noFill/>
+        </p:spPr>
+        <p:txBody>
+          <a:bodyPr wrap="square" rtlCol="0">
+            <a:spAutoFit/>
+          </a:bodyPr>
+          <a:lstStyle/>
+          <a:p>
+            <a:r>
+              <a:rPr lang="en-US" dirty="0"/>
+              <a:t>Beam Aperture</a:t>
+            </a:r>
+          </a:p>
+        </p:txBody>
+      </p:sp>
+      <p:pic>
+        <p:nvPicPr>
+          <p:cNvPr id="20" name="Picture 19" descr="A picture containing fruit&#10;&#10;Description automatically generated">
+            <a:extLst>
+              <a:ext uri="{FF2B5EF4-FFF2-40B4-BE49-F238E27FC236}">
+                <a16:creationId xmlns:a16="http://schemas.microsoft.com/office/drawing/2014/main" id="{E9A32A7C-1825-F749-9400-DFE8033C672B}"/>
+              </a:ext>
+            </a:extLst>
+          </p:cNvPr>
+          <p:cNvPicPr>
+            <a:picLocks noChangeAspect="1"/>
+          </p:cNvPicPr>
+          <p:nvPr/>
+        </p:nvPicPr>
+        <p:blipFill>
+          <a:blip r:embed="rId3"/>
+          <a:stretch>
+            <a:fillRect/>
+          </a:stretch>
+        </p:blipFill>
+        <p:spPr>
+          <a:xfrm>
+            <a:off x="567467" y="1884006"/>
+            <a:ext cx="5430818" cy="4073113"/>
+          </a:xfrm>
+          <a:prstGeom prst="rect">
+            <a:avLst/>
+          </a:prstGeom>
+        </p:spPr>
+      </p:pic>
+      <p:sp>
+        <p:nvSpPr>
+          <p:cNvPr id="29" name="TextBox 28">
+            <a:extLst>
+              <a:ext uri="{FF2B5EF4-FFF2-40B4-BE49-F238E27FC236}">
+                <a16:creationId xmlns:a16="http://schemas.microsoft.com/office/drawing/2014/main" id="{B4E585F9-B62B-0640-AB60-ECB92A250B2C}"/>
+              </a:ext>
+            </a:extLst>
+          </p:cNvPr>
+          <p:cNvSpPr txBox="1"/>
+          <p:nvPr/>
+        </p:nvSpPr>
+        <p:spPr>
+          <a:xfrm>
+            <a:off x="1987589" y="5957119"/>
+            <a:ext cx="2590574" cy="369332"/>
+          </a:xfrm>
+          <a:prstGeom prst="rect">
+            <a:avLst/>
+          </a:prstGeom>
+          <a:noFill/>
+        </p:spPr>
+        <p:txBody>
+          <a:bodyPr wrap="square" rtlCol="0">
+            <a:spAutoFit/>
+          </a:bodyPr>
+          <a:lstStyle/>
+          <a:p>
+            <a:pPr algn="ctr"/>
+            <a:r>
+              <a:rPr lang="en-US" dirty="0"/>
+              <a:t>Unpruned Trajectories</a:t>
+            </a:r>
+          </a:p>
+        </p:txBody>
+      </p:sp>
+      <p:sp>
+        <p:nvSpPr>
+          <p:cNvPr id="30" name="TextBox 29">
+            <a:extLst>
+              <a:ext uri="{FF2B5EF4-FFF2-40B4-BE49-F238E27FC236}">
+                <a16:creationId xmlns:a16="http://schemas.microsoft.com/office/drawing/2014/main" id="{A23158BE-AE7D-9C47-B7B8-510195309BBC}"/>
+              </a:ext>
+            </a:extLst>
+          </p:cNvPr>
+          <p:cNvSpPr txBox="1"/>
+          <p:nvPr/>
+        </p:nvSpPr>
+        <p:spPr>
+          <a:xfrm>
+            <a:off x="8346556" y="5957119"/>
+            <a:ext cx="1467789" cy="369332"/>
+          </a:xfrm>
+          <a:prstGeom prst="rect">
+            <a:avLst/>
+          </a:prstGeom>
+          <a:noFill/>
+        </p:spPr>
+        <p:txBody>
+          <a:bodyPr wrap="square" rtlCol="0">
+            <a:spAutoFit/>
+          </a:bodyPr>
+          <a:lstStyle/>
+          <a:p>
+            <a:pPr algn="ctr"/>
+            <a:r>
+              <a:rPr lang="en-US" dirty="0"/>
+              <a:t>Without Lens</a:t>
+            </a:r>
+          </a:p>
+        </p:txBody>
+      </p:sp>
+      <p:cxnSp>
+        <p:nvCxnSpPr>
+          <p:cNvPr id="47" name="Straight Connector 46">
+            <a:extLst>
+              <a:ext uri="{FF2B5EF4-FFF2-40B4-BE49-F238E27FC236}">
+                <a16:creationId xmlns:a16="http://schemas.microsoft.com/office/drawing/2014/main" id="{0DA1DCB6-7124-0348-AC6A-CDEBC6DC4E93}"/>
+              </a:ext>
+            </a:extLst>
+          </p:cNvPr>
+          <p:cNvCxnSpPr>
+            <a:cxnSpLocks/>
+          </p:cNvCxnSpPr>
+          <p:nvPr/>
+        </p:nvCxnSpPr>
+        <p:spPr>
+          <a:xfrm>
+            <a:off x="1761464" y="4908331"/>
+            <a:ext cx="0" cy="601718"/>
+          </a:xfrm>
+          <a:prstGeom prst="line">
+            <a:avLst/>
+          </a:prstGeom>
+          <a:ln w="57150">
+            <a:solidFill>
+              <a:schemeClr val="tx2">
+                <a:lumMod val="60000"/>
+                <a:lumOff val="40000"/>
+              </a:schemeClr>
+            </a:solidFill>
+          </a:ln>
+        </p:spPr>
+        <p:style>
+          <a:lnRef idx="1">
+            <a:schemeClr val="accent1"/>
+          </a:lnRef>
+          <a:fillRef idx="0">
+            <a:schemeClr val="accent1"/>
+          </a:fillRef>
+          <a:effectRef idx="0">
+            <a:schemeClr val="accent1"/>
+          </a:effectRef>
+          <a:fontRef idx="minor">
+            <a:schemeClr val="tx1"/>
+          </a:fontRef>
+        </p:style>
+      </p:cxnSp>
+      <p:cxnSp>
+        <p:nvCxnSpPr>
+          <p:cNvPr id="48" name="Straight Connector 47">
+            <a:extLst>
+              <a:ext uri="{FF2B5EF4-FFF2-40B4-BE49-F238E27FC236}">
+                <a16:creationId xmlns:a16="http://schemas.microsoft.com/office/drawing/2014/main" id="{240C5905-F813-784A-962B-E01F2DC752FB}"/>
+              </a:ext>
+            </a:extLst>
+          </p:cNvPr>
+          <p:cNvCxnSpPr>
+            <a:cxnSpLocks/>
+          </p:cNvCxnSpPr>
+          <p:nvPr/>
+        </p:nvCxnSpPr>
+        <p:spPr>
+          <a:xfrm>
+            <a:off x="1761464" y="2363350"/>
+            <a:ext cx="0" cy="590057"/>
+          </a:xfrm>
+          <a:prstGeom prst="line">
+            <a:avLst/>
+          </a:prstGeom>
+          <a:ln w="57150">
+            <a:solidFill>
+              <a:schemeClr val="tx2">
+                <a:lumMod val="60000"/>
+                <a:lumOff val="40000"/>
+              </a:schemeClr>
+            </a:solidFill>
+          </a:ln>
+        </p:spPr>
+        <p:style>
+          <a:lnRef idx="1">
+            <a:schemeClr val="accent1"/>
+          </a:lnRef>
+          <a:fillRef idx="0">
+            <a:schemeClr val="accent1"/>
+          </a:fillRef>
+          <a:effectRef idx="0">
+            <a:schemeClr val="accent1"/>
+          </a:effectRef>
+          <a:fontRef idx="minor">
+            <a:schemeClr val="tx1"/>
+          </a:fontRef>
+        </p:style>
+      </p:cxnSp>
+      <p:cxnSp>
+        <p:nvCxnSpPr>
+          <p:cNvPr id="49" name="Straight Connector 48">
+            <a:extLst>
+              <a:ext uri="{FF2B5EF4-FFF2-40B4-BE49-F238E27FC236}">
+                <a16:creationId xmlns:a16="http://schemas.microsoft.com/office/drawing/2014/main" id="{922C3627-6FCC-AA43-A7E2-163956BC6E40}"/>
+              </a:ext>
+            </a:extLst>
+          </p:cNvPr>
+          <p:cNvCxnSpPr>
+            <a:cxnSpLocks/>
+          </p:cNvCxnSpPr>
+          <p:nvPr/>
+        </p:nvCxnSpPr>
+        <p:spPr>
+          <a:xfrm>
+            <a:off x="3127805" y="5318234"/>
+            <a:ext cx="0" cy="191815"/>
+          </a:xfrm>
+          <a:prstGeom prst="line">
+            <a:avLst/>
+          </a:prstGeom>
+          <a:ln w="57150">
+            <a:solidFill>
+              <a:schemeClr val="tx2">
+                <a:lumMod val="60000"/>
+                <a:lumOff val="40000"/>
+              </a:schemeClr>
+            </a:solidFill>
+          </a:ln>
+        </p:spPr>
+        <p:style>
+          <a:lnRef idx="1">
+            <a:schemeClr val="accent1"/>
+          </a:lnRef>
+          <a:fillRef idx="0">
+            <a:schemeClr val="accent1"/>
+          </a:fillRef>
+          <a:effectRef idx="0">
+            <a:schemeClr val="accent1"/>
+          </a:effectRef>
+          <a:fontRef idx="minor">
+            <a:schemeClr val="tx1"/>
+          </a:fontRef>
+        </p:style>
+      </p:cxnSp>
+      <p:cxnSp>
+        <p:nvCxnSpPr>
+          <p:cNvPr id="50" name="Straight Connector 49">
+            <a:extLst>
+              <a:ext uri="{FF2B5EF4-FFF2-40B4-BE49-F238E27FC236}">
+                <a16:creationId xmlns:a16="http://schemas.microsoft.com/office/drawing/2014/main" id="{B3E482F9-AB83-0E48-8CC0-C62E697D05B5}"/>
+              </a:ext>
+            </a:extLst>
+          </p:cNvPr>
+          <p:cNvCxnSpPr>
+            <a:cxnSpLocks/>
+          </p:cNvCxnSpPr>
+          <p:nvPr/>
+        </p:nvCxnSpPr>
+        <p:spPr>
+          <a:xfrm>
+            <a:off x="3144555" y="2362611"/>
+            <a:ext cx="0" cy="186998"/>
+          </a:xfrm>
+          <a:prstGeom prst="line">
+            <a:avLst/>
+          </a:prstGeom>
+          <a:ln w="57150">
+            <a:solidFill>
+              <a:schemeClr val="tx2">
+                <a:lumMod val="60000"/>
+                <a:lumOff val="40000"/>
+              </a:schemeClr>
+            </a:solidFill>
+          </a:ln>
+        </p:spPr>
+        <p:style>
+          <a:lnRef idx="1">
+            <a:schemeClr val="accent1"/>
+          </a:lnRef>
+          <a:fillRef idx="0">
+            <a:schemeClr val="accent1"/>
+          </a:fillRef>
+          <a:effectRef idx="0">
+            <a:schemeClr val="accent1"/>
+          </a:effectRef>
+          <a:fontRef idx="minor">
+            <a:schemeClr val="tx1"/>
+          </a:fontRef>
+        </p:style>
+      </p:cxnSp>
+      <p:sp>
+        <p:nvSpPr>
+          <p:cNvPr id="51" name="TextBox 50">
+            <a:extLst>
+              <a:ext uri="{FF2B5EF4-FFF2-40B4-BE49-F238E27FC236}">
+                <a16:creationId xmlns:a16="http://schemas.microsoft.com/office/drawing/2014/main" id="{0C1BF7AE-613C-664F-B10F-770A8EF029E8}"/>
+              </a:ext>
+            </a:extLst>
+          </p:cNvPr>
+          <p:cNvSpPr txBox="1"/>
+          <p:nvPr/>
+        </p:nvSpPr>
+        <p:spPr>
+          <a:xfrm>
+            <a:off x="1766157" y="2362611"/>
+            <a:ext cx="1156121" cy="646331"/>
+          </a:xfrm>
+          <a:prstGeom prst="rect">
+            <a:avLst/>
+          </a:prstGeom>
+          <a:noFill/>
+        </p:spPr>
+        <p:txBody>
+          <a:bodyPr wrap="square" rtlCol="0">
+            <a:spAutoFit/>
+          </a:bodyPr>
+          <a:lstStyle/>
+          <a:p>
+            <a:r>
+              <a:rPr lang="en-US" dirty="0"/>
+              <a:t>4K Aperture</a:t>
+            </a:r>
+          </a:p>
+        </p:txBody>
+      </p:sp>
+      <p:sp>
+        <p:nvSpPr>
+          <p:cNvPr id="52" name="TextBox 51">
+            <a:extLst>
+              <a:ext uri="{FF2B5EF4-FFF2-40B4-BE49-F238E27FC236}">
+                <a16:creationId xmlns:a16="http://schemas.microsoft.com/office/drawing/2014/main" id="{7C62BDF3-F65A-EC45-AFCF-45C3524D67BB}"/>
+              </a:ext>
+            </a:extLst>
+          </p:cNvPr>
+          <p:cNvSpPr txBox="1"/>
+          <p:nvPr/>
+        </p:nvSpPr>
+        <p:spPr>
+          <a:xfrm>
+            <a:off x="4161769" y="3639235"/>
+            <a:ext cx="1156121" cy="646331"/>
+          </a:xfrm>
+          <a:prstGeom prst="rect">
+            <a:avLst/>
+          </a:prstGeom>
+          <a:noFill/>
+        </p:spPr>
+        <p:txBody>
+          <a:bodyPr wrap="square" rtlCol="0">
+            <a:spAutoFit/>
+          </a:bodyPr>
+          <a:lstStyle/>
+          <a:p>
+            <a:r>
+              <a:rPr lang="en-US" dirty="0"/>
+              <a:t>MOT Region</a:t>
+            </a:r>
+          </a:p>
+        </p:txBody>
+      </p:sp>
+      <p:cxnSp>
+        <p:nvCxnSpPr>
+          <p:cNvPr id="53" name="Straight Connector 52">
+            <a:extLst>
+              <a:ext uri="{FF2B5EF4-FFF2-40B4-BE49-F238E27FC236}">
+                <a16:creationId xmlns:a16="http://schemas.microsoft.com/office/drawing/2014/main" id="{F09CF453-1E94-6745-9321-4F2F881A636F}"/>
+              </a:ext>
+            </a:extLst>
+          </p:cNvPr>
+          <p:cNvCxnSpPr>
+            <a:cxnSpLocks/>
+          </p:cNvCxnSpPr>
+          <p:nvPr/>
+        </p:nvCxnSpPr>
+        <p:spPr>
+          <a:xfrm>
+            <a:off x="4136805" y="3699644"/>
+            <a:ext cx="0" cy="522862"/>
+          </a:xfrm>
+          <a:prstGeom prst="line">
+            <a:avLst/>
+          </a:prstGeom>
+          <a:ln w="57150">
+            <a:solidFill>
+              <a:schemeClr val="tx2"/>
+            </a:solidFill>
+          </a:ln>
+        </p:spPr>
+        <p:style>
+          <a:lnRef idx="1">
+            <a:schemeClr val="accent1"/>
+          </a:lnRef>
+          <a:fillRef idx="0">
+            <a:schemeClr val="accent1"/>
+          </a:fillRef>
+          <a:effectRef idx="0">
+            <a:schemeClr val="accent1"/>
+          </a:effectRef>
+          <a:fontRef idx="minor">
+            <a:schemeClr val="tx1"/>
+          </a:fontRef>
+        </p:style>
+      </p:cxnSp>
+      <p:sp>
+        <p:nvSpPr>
+          <p:cNvPr id="54" name="TextBox 53">
+            <a:extLst>
+              <a:ext uri="{FF2B5EF4-FFF2-40B4-BE49-F238E27FC236}">
+                <a16:creationId xmlns:a16="http://schemas.microsoft.com/office/drawing/2014/main" id="{21685D39-8ED0-1942-BF04-C4384FA5EA59}"/>
+              </a:ext>
+            </a:extLst>
+          </p:cNvPr>
+          <p:cNvSpPr txBox="1"/>
+          <p:nvPr/>
+        </p:nvSpPr>
+        <p:spPr>
+          <a:xfrm>
+            <a:off x="3144555" y="2307076"/>
             <a:ext cx="1156121" cy="646331"/>
           </a:xfrm>
           <a:prstGeom prst="rect">
@@ -4355,6 +4789,12 @@
         <p:txBody>
           <a:bodyPr/>
           <a:lstStyle/>
+          <a:p>
+            <a:r>
+              <a:rPr lang="en-US" dirty="0"/>
+              <a:t>Denser mesh, more particles</a:t>
+            </a:r>
+          </a:p>
           <a:p>
             <a:r>
               <a:rPr lang="en-US" dirty="0"/>

</xml_diff>

<commit_message>
cleaning updates from previous commit
</commit_message>
<xml_diff>
--- a/magnetic_lens_monte_carlo/magnetic_lens_jun_18.pptx
+++ b/magnetic_lens_monte_carlo/magnetic_lens_jun_18.pptx
@@ -16,7 +16,8 @@
     <p:sldId id="263" r:id="rId10"/>
     <p:sldId id="264" r:id="rId11"/>
     <p:sldId id="266" r:id="rId12"/>
-    <p:sldId id="265" r:id="rId13"/>
+    <p:sldId id="268" r:id="rId13"/>
+    <p:sldId id="265" r:id="rId14"/>
   </p:sldIdLst>
   <p:sldSz cx="12192000" cy="6858000"/>
   <p:notesSz cx="6858000" cy="9144000"/>
@@ -115,6 +116,11 @@
       </a:defRPr>
     </a:lvl9pPr>
   </p:defaultTextStyle>
+  <p:extLst>
+    <p:ext uri="{EFAFB233-063F-42B5-8137-9DF3F51BA10A}">
+      <p15:sldGuideLst xmlns:p15="http://schemas.microsoft.com/office/powerpoint/2012/main"/>
+    </p:ext>
+  </p:extLst>
 </p:presentation>
 </file>
 
@@ -265,7 +271,7 @@
           <a:p>
             <a:fld id="{216EB885-1E32-5A45-959C-67B9EF95D560}" type="datetimeFigureOut">
               <a:rPr lang="en-US" smtClean="0"/>
-              <a:t>6/18/20</a:t>
+              <a:t>6/24/20</a:t>
             </a:fld>
             <a:endParaRPr lang="en-US"/>
           </a:p>
@@ -463,7 +469,7 @@
           <a:p>
             <a:fld id="{216EB885-1E32-5A45-959C-67B9EF95D560}" type="datetimeFigureOut">
               <a:rPr lang="en-US" smtClean="0"/>
-              <a:t>6/18/20</a:t>
+              <a:t>6/24/20</a:t>
             </a:fld>
             <a:endParaRPr lang="en-US"/>
           </a:p>
@@ -671,7 +677,7 @@
           <a:p>
             <a:fld id="{216EB885-1E32-5A45-959C-67B9EF95D560}" type="datetimeFigureOut">
               <a:rPr lang="en-US" smtClean="0"/>
-              <a:t>6/18/20</a:t>
+              <a:t>6/24/20</a:t>
             </a:fld>
             <a:endParaRPr lang="en-US"/>
           </a:p>
@@ -869,7 +875,7 @@
           <a:p>
             <a:fld id="{216EB885-1E32-5A45-959C-67B9EF95D560}" type="datetimeFigureOut">
               <a:rPr lang="en-US" smtClean="0"/>
-              <a:t>6/18/20</a:t>
+              <a:t>6/24/20</a:t>
             </a:fld>
             <a:endParaRPr lang="en-US"/>
           </a:p>
@@ -1144,7 +1150,7 @@
           <a:p>
             <a:fld id="{216EB885-1E32-5A45-959C-67B9EF95D560}" type="datetimeFigureOut">
               <a:rPr lang="en-US" smtClean="0"/>
-              <a:t>6/18/20</a:t>
+              <a:t>6/24/20</a:t>
             </a:fld>
             <a:endParaRPr lang="en-US"/>
           </a:p>
@@ -1409,7 +1415,7 @@
           <a:p>
             <a:fld id="{216EB885-1E32-5A45-959C-67B9EF95D560}" type="datetimeFigureOut">
               <a:rPr lang="en-US" smtClean="0"/>
-              <a:t>6/18/20</a:t>
+              <a:t>6/24/20</a:t>
             </a:fld>
             <a:endParaRPr lang="en-US"/>
           </a:p>
@@ -1821,7 +1827,7 @@
           <a:p>
             <a:fld id="{216EB885-1E32-5A45-959C-67B9EF95D560}" type="datetimeFigureOut">
               <a:rPr lang="en-US" smtClean="0"/>
-              <a:t>6/18/20</a:t>
+              <a:t>6/24/20</a:t>
             </a:fld>
             <a:endParaRPr lang="en-US"/>
           </a:p>
@@ -1962,7 +1968,7 @@
           <a:p>
             <a:fld id="{216EB885-1E32-5A45-959C-67B9EF95D560}" type="datetimeFigureOut">
               <a:rPr lang="en-US" smtClean="0"/>
-              <a:t>6/18/20</a:t>
+              <a:t>6/24/20</a:t>
             </a:fld>
             <a:endParaRPr lang="en-US"/>
           </a:p>
@@ -2075,7 +2081,7 @@
           <a:p>
             <a:fld id="{216EB885-1E32-5A45-959C-67B9EF95D560}" type="datetimeFigureOut">
               <a:rPr lang="en-US" smtClean="0"/>
-              <a:t>6/18/20</a:t>
+              <a:t>6/24/20</a:t>
             </a:fld>
             <a:endParaRPr lang="en-US"/>
           </a:p>
@@ -2386,7 +2392,7 @@
           <a:p>
             <a:fld id="{216EB885-1E32-5A45-959C-67B9EF95D560}" type="datetimeFigureOut">
               <a:rPr lang="en-US" smtClean="0"/>
-              <a:t>6/18/20</a:t>
+              <a:t>6/24/20</a:t>
             </a:fld>
             <a:endParaRPr lang="en-US"/>
           </a:p>
@@ -2674,7 +2680,7 @@
           <a:p>
             <a:fld id="{216EB885-1E32-5A45-959C-67B9EF95D560}" type="datetimeFigureOut">
               <a:rPr lang="en-US" smtClean="0"/>
-              <a:t>6/18/20</a:t>
+              <a:t>6/24/20</a:t>
             </a:fld>
             <a:endParaRPr lang="en-US"/>
           </a:p>
@@ -2915,7 +2921,7 @@
           <a:p>
             <a:fld id="{216EB885-1E32-5A45-959C-67B9EF95D560}" type="datetimeFigureOut">
               <a:rPr lang="en-US" smtClean="0"/>
-              <a:t>6/18/20</a:t>
+              <a:t>6/24/20</a:t>
             </a:fld>
             <a:endParaRPr lang="en-US"/>
           </a:p>
@@ -3426,111 +3432,12 @@
           <a:chExt cx="0" cy="0"/>
         </a:xfrm>
       </p:grpSpPr>
-      <p:sp>
-        <p:nvSpPr>
-          <p:cNvPr id="2" name="Title 1">
-            <a:extLst>
-              <a:ext uri="{FF2B5EF4-FFF2-40B4-BE49-F238E27FC236}">
-                <a16:creationId xmlns:a16="http://schemas.microsoft.com/office/drawing/2014/main" id="{C5C22FF0-7BF6-5A4F-8422-C35DADB4D222}"/>
-              </a:ext>
-            </a:extLst>
-          </p:cNvPr>
-          <p:cNvSpPr>
-            <a:spLocks noGrp="1"/>
-          </p:cNvSpPr>
-          <p:nvPr>
-            <p:ph type="title"/>
-          </p:nvPr>
-        </p:nvSpPr>
-        <p:spPr/>
-        <p:txBody>
-          <a:bodyPr/>
-          <a:lstStyle/>
-          <a:p>
-            <a:r>
-              <a:rPr lang="en-US" dirty="0"/>
-              <a:t>Monte Carlo Particle Trajectory Simulation</a:t>
-            </a:r>
-          </a:p>
-        </p:txBody>
-      </p:sp>
-      <p:sp>
-        <p:nvSpPr>
-          <p:cNvPr id="3" name="Content Placeholder 2">
-            <a:extLst>
-              <a:ext uri="{FF2B5EF4-FFF2-40B4-BE49-F238E27FC236}">
-                <a16:creationId xmlns:a16="http://schemas.microsoft.com/office/drawing/2014/main" id="{389F8493-F6DA-7245-877F-289BDFB60ACB}"/>
-              </a:ext>
-            </a:extLst>
-          </p:cNvPr>
-          <p:cNvSpPr>
-            <a:spLocks noGrp="1"/>
-          </p:cNvSpPr>
-          <p:nvPr>
-            <p:ph idx="1"/>
-          </p:nvPr>
-        </p:nvSpPr>
-        <p:spPr>
-          <a:xfrm>
-            <a:off x="8135007" y="2099440"/>
-            <a:ext cx="3218793" cy="4619298"/>
-          </a:xfrm>
-        </p:spPr>
-        <p:txBody>
-          <a:bodyPr>
-            <a:normAutofit/>
-          </a:bodyPr>
-          <a:lstStyle/>
-          <a:p>
-            <a:r>
-              <a:rPr lang="en-US" dirty="0"/>
-              <a:t>Yield ratio without lens: ~0.0124) (~110-130 particles make it into the MOT region)</a:t>
-            </a:r>
-          </a:p>
-          <a:p>
-            <a:r>
-              <a:rPr lang="en-US" dirty="0"/>
-              <a:t>Yield ratio with lens: ~0.0181 (~180-200 particles make it into the MOT region)</a:t>
-            </a:r>
-          </a:p>
-        </p:txBody>
-      </p:sp>
-      <p:pic>
-        <p:nvPicPr>
-          <p:cNvPr id="5" name="Picture 4" descr="A close up of a piece of paper&#10;&#10;Description automatically generated">
-            <a:extLst>
-              <a:ext uri="{FF2B5EF4-FFF2-40B4-BE49-F238E27FC236}">
-                <a16:creationId xmlns:a16="http://schemas.microsoft.com/office/drawing/2014/main" id="{54C950AE-5788-884E-B9A6-73D5DDD7766B}"/>
-              </a:ext>
-            </a:extLst>
-          </p:cNvPr>
-          <p:cNvPicPr>
-            <a:picLocks noChangeAspect="1"/>
-          </p:cNvPicPr>
-          <p:nvPr/>
-        </p:nvPicPr>
-        <p:blipFill>
-          <a:blip r:embed="rId2"/>
-          <a:stretch>
-            <a:fillRect/>
-          </a:stretch>
-        </p:blipFill>
-        <p:spPr>
-          <a:xfrm>
-            <a:off x="838200" y="1364374"/>
-            <a:ext cx="7139152" cy="5354364"/>
-          </a:xfrm>
-          <a:prstGeom prst="rect">
-            <a:avLst/>
-          </a:prstGeom>
-        </p:spPr>
-      </p:pic>
       <p:cxnSp>
         <p:nvCxnSpPr>
-          <p:cNvPr id="6" name="Straight Connector 5">
-            <a:extLst>
-              <a:ext uri="{FF2B5EF4-FFF2-40B4-BE49-F238E27FC236}">
-                <a16:creationId xmlns:a16="http://schemas.microsoft.com/office/drawing/2014/main" id="{262FD34F-8115-6A49-8770-37D7C00C5525}"/>
+          <p:cNvPr id="19" name="Straight Connector 18">
+            <a:extLst>
+              <a:ext uri="{FF2B5EF4-FFF2-40B4-BE49-F238E27FC236}">
+                <a16:creationId xmlns:a16="http://schemas.microsoft.com/office/drawing/2014/main" id="{F915858B-E330-594A-A550-D4B0AC80EBBA}"/>
               </a:ext>
             </a:extLst>
           </p:cNvPr>
@@ -3541,18 +3448,15 @@
         </p:nvCxnSpPr>
         <p:spPr>
           <a:xfrm>
-            <a:off x="2596049" y="5328745"/>
-            <a:ext cx="0" cy="790904"/>
+            <a:off x="3573516" y="4081299"/>
+            <a:ext cx="0" cy="515006"/>
           </a:xfrm>
           <a:prstGeom prst="line">
             <a:avLst/>
           </a:prstGeom>
           <a:ln w="57150">
             <a:solidFill>
-              <a:schemeClr val="tx2">
-                <a:lumMod val="60000"/>
-                <a:lumOff val="40000"/>
-              </a:schemeClr>
+              <a:schemeClr val="tx2"/>
             </a:solidFill>
           </a:ln>
         </p:spPr>
@@ -3571,144 +3475,104 @@
           </a:fontRef>
         </p:style>
       </p:cxnSp>
-      <p:cxnSp>
-        <p:nvCxnSpPr>
-          <p:cNvPr id="7" name="Straight Connector 6">
-            <a:extLst>
-              <a:ext uri="{FF2B5EF4-FFF2-40B4-BE49-F238E27FC236}">
-                <a16:creationId xmlns:a16="http://schemas.microsoft.com/office/drawing/2014/main" id="{F0D55BC9-2985-024B-A58F-C99F19339ED0}"/>
-              </a:ext>
-            </a:extLst>
-          </p:cNvPr>
-          <p:cNvCxnSpPr>
-            <a:cxnSpLocks/>
-          </p:cNvCxnSpPr>
+      <p:pic>
+        <p:nvPicPr>
+          <p:cNvPr id="8" name="Picture 7">
+            <a:extLst>
+              <a:ext uri="{FF2B5EF4-FFF2-40B4-BE49-F238E27FC236}">
+                <a16:creationId xmlns:a16="http://schemas.microsoft.com/office/drawing/2014/main" id="{D74A1759-65CC-014D-B35B-E1637748FEFA}"/>
+              </a:ext>
+            </a:extLst>
+          </p:cNvPr>
+          <p:cNvPicPr>
+            <a:picLocks noChangeAspect="1"/>
+          </p:cNvPicPr>
           <p:nvPr/>
-        </p:nvCxnSpPr>
-        <p:spPr>
-          <a:xfrm>
-            <a:off x="2617073" y="2005999"/>
-            <a:ext cx="0" cy="852815"/>
-          </a:xfrm>
-          <a:prstGeom prst="line">
+        </p:nvPicPr>
+        <p:blipFill>
+          <a:blip r:embed="rId2"/>
+          <a:srcRect/>
+          <a:stretch/>
+        </p:blipFill>
+        <p:spPr>
+          <a:xfrm>
+            <a:off x="775138" y="1430033"/>
+            <a:ext cx="7070042" cy="5302531"/>
+          </a:xfrm>
+          <a:prstGeom prst="rect">
             <a:avLst/>
           </a:prstGeom>
-          <a:ln w="57150">
-            <a:solidFill>
-              <a:schemeClr val="tx2">
-                <a:lumMod val="60000"/>
-                <a:lumOff val="40000"/>
-              </a:schemeClr>
-            </a:solidFill>
-          </a:ln>
-        </p:spPr>
-        <p:style>
-          <a:lnRef idx="1">
-            <a:schemeClr val="accent1"/>
-          </a:lnRef>
-          <a:fillRef idx="0">
-            <a:schemeClr val="accent1"/>
-          </a:fillRef>
-          <a:effectRef idx="0">
-            <a:schemeClr val="accent1"/>
-          </a:effectRef>
-          <a:fontRef idx="minor">
-            <a:schemeClr val="tx1"/>
-          </a:fontRef>
-        </p:style>
-      </p:cxnSp>
-      <p:cxnSp>
-        <p:nvCxnSpPr>
-          <p:cNvPr id="11" name="Straight Connector 10">
-            <a:extLst>
-              <a:ext uri="{FF2B5EF4-FFF2-40B4-BE49-F238E27FC236}">
-                <a16:creationId xmlns:a16="http://schemas.microsoft.com/office/drawing/2014/main" id="{05479989-3C02-8B48-B37A-D92DC01687F6}"/>
-              </a:ext>
-            </a:extLst>
-          </p:cNvPr>
-          <p:cNvCxnSpPr>
-            <a:cxnSpLocks/>
-          </p:cNvCxnSpPr>
-          <p:nvPr/>
-        </p:nvCxnSpPr>
-        <p:spPr>
-          <a:xfrm>
-            <a:off x="4351277" y="5885793"/>
-            <a:ext cx="0" cy="233856"/>
-          </a:xfrm>
-          <a:prstGeom prst="line">
-            <a:avLst/>
-          </a:prstGeom>
-          <a:ln w="57150">
-            <a:solidFill>
-              <a:schemeClr val="tx2">
-                <a:lumMod val="60000"/>
-                <a:lumOff val="40000"/>
-              </a:schemeClr>
-            </a:solidFill>
-          </a:ln>
-        </p:spPr>
-        <p:style>
-          <a:lnRef idx="1">
-            <a:schemeClr val="accent1"/>
-          </a:lnRef>
-          <a:fillRef idx="0">
-            <a:schemeClr val="accent1"/>
-          </a:fillRef>
-          <a:effectRef idx="0">
-            <a:schemeClr val="accent1"/>
-          </a:effectRef>
-          <a:fontRef idx="minor">
-            <a:schemeClr val="tx1"/>
-          </a:fontRef>
-        </p:style>
-      </p:cxnSp>
-      <p:cxnSp>
-        <p:nvCxnSpPr>
-          <p:cNvPr id="12" name="Straight Connector 11">
-            <a:extLst>
-              <a:ext uri="{FF2B5EF4-FFF2-40B4-BE49-F238E27FC236}">
-                <a16:creationId xmlns:a16="http://schemas.microsoft.com/office/drawing/2014/main" id="{922D90DE-F41B-BC4F-A303-6FFC1A017F2C}"/>
-              </a:ext>
-            </a:extLst>
-          </p:cNvPr>
-          <p:cNvCxnSpPr>
-            <a:cxnSpLocks/>
-          </p:cNvCxnSpPr>
-          <p:nvPr/>
-        </p:nvCxnSpPr>
-        <p:spPr>
-          <a:xfrm>
-            <a:off x="4372301" y="2005999"/>
-            <a:ext cx="0" cy="295767"/>
-          </a:xfrm>
-          <a:prstGeom prst="line">
-            <a:avLst/>
-          </a:prstGeom>
-          <a:ln w="57150">
-            <a:solidFill>
-              <a:schemeClr val="tx2">
-                <a:lumMod val="60000"/>
-                <a:lumOff val="40000"/>
-              </a:schemeClr>
-            </a:solidFill>
-          </a:ln>
-        </p:spPr>
-        <p:style>
-          <a:lnRef idx="1">
-            <a:schemeClr val="accent1"/>
-          </a:lnRef>
-          <a:fillRef idx="0">
-            <a:schemeClr val="accent1"/>
-          </a:fillRef>
-          <a:effectRef idx="0">
-            <a:schemeClr val="accent1"/>
-          </a:effectRef>
-          <a:fontRef idx="minor">
-            <a:schemeClr val="tx1"/>
-          </a:fontRef>
-        </p:style>
-      </p:cxnSp>
+        </p:spPr>
+      </p:pic>
+      <p:sp>
+        <p:nvSpPr>
+          <p:cNvPr id="2" name="Title 1">
+            <a:extLst>
+              <a:ext uri="{FF2B5EF4-FFF2-40B4-BE49-F238E27FC236}">
+                <a16:creationId xmlns:a16="http://schemas.microsoft.com/office/drawing/2014/main" id="{C5C22FF0-7BF6-5A4F-8422-C35DADB4D222}"/>
+              </a:ext>
+            </a:extLst>
+          </p:cNvPr>
+          <p:cNvSpPr>
+            <a:spLocks noGrp="1"/>
+          </p:cNvSpPr>
+          <p:nvPr>
+            <p:ph type="title"/>
+          </p:nvPr>
+        </p:nvSpPr>
+        <p:spPr/>
+        <p:txBody>
+          <a:bodyPr/>
+          <a:lstStyle/>
+          <a:p>
+            <a:r>
+              <a:rPr lang="en-US" dirty="0"/>
+              <a:t>Monte Carlo Particle Trajectory Simulation</a:t>
+            </a:r>
+          </a:p>
+        </p:txBody>
+      </p:sp>
+      <p:sp>
+        <p:nvSpPr>
+          <p:cNvPr id="3" name="Content Placeholder 2">
+            <a:extLst>
+              <a:ext uri="{FF2B5EF4-FFF2-40B4-BE49-F238E27FC236}">
+                <a16:creationId xmlns:a16="http://schemas.microsoft.com/office/drawing/2014/main" id="{389F8493-F6DA-7245-877F-289BDFB60ACB}"/>
+              </a:ext>
+            </a:extLst>
+          </p:cNvPr>
+          <p:cNvSpPr>
+            <a:spLocks noGrp="1"/>
+          </p:cNvSpPr>
+          <p:nvPr>
+            <p:ph idx="1"/>
+          </p:nvPr>
+        </p:nvSpPr>
+        <p:spPr>
+          <a:xfrm>
+            <a:off x="8135007" y="2099440"/>
+            <a:ext cx="3218793" cy="4619298"/>
+          </a:xfrm>
+        </p:spPr>
+        <p:txBody>
+          <a:bodyPr>
+            <a:normAutofit/>
+          </a:bodyPr>
+          <a:lstStyle/>
+          <a:p>
+            <a:r>
+              <a:rPr lang="en-US" dirty="0"/>
+              <a:t>Yield ratio with lens: ~0.0142) (~111-140 particles make it into the MOT region)</a:t>
+            </a:r>
+          </a:p>
+          <a:p>
+            <a:r>
+              <a:rPr lang="en-US" dirty="0"/>
+              <a:t>Yield ratio without lens: ~0.0097 (~70-108 particles make it into the MOT region)</a:t>
+            </a:r>
+          </a:p>
+        </p:txBody>
+      </p:sp>
       <p:sp>
         <p:nvSpPr>
           <p:cNvPr id="17" name="TextBox 16">
@@ -3723,7 +3587,7 @@
         </p:nvSpPr>
         <p:spPr>
           <a:xfrm>
-            <a:off x="2638093" y="1957580"/>
+            <a:off x="2581107" y="2653316"/>
             <a:ext cx="1156121" cy="646331"/>
           </a:xfrm>
           <a:prstGeom prst="rect">
@@ -3758,7 +3622,7 @@
         </p:nvSpPr>
         <p:spPr>
           <a:xfrm>
-            <a:off x="5626976" y="3744338"/>
+            <a:off x="5553404" y="3796889"/>
             <a:ext cx="1156121" cy="646331"/>
           </a:xfrm>
           <a:prstGeom prst="rect">
@@ -3772,6 +3636,7 @@
           </a:bodyPr>
           <a:lstStyle/>
           <a:p>
+            <a:pPr algn="r"/>
             <a:r>
               <a:rPr lang="en-US" dirty="0"/>
               <a:t>MOT Region</a:t>
@@ -3779,49 +3644,6 @@
           </a:p>
         </p:txBody>
       </p:sp>
-      <p:cxnSp>
-        <p:nvCxnSpPr>
-          <p:cNvPr id="19" name="Straight Connector 18">
-            <a:extLst>
-              <a:ext uri="{FF2B5EF4-FFF2-40B4-BE49-F238E27FC236}">
-                <a16:creationId xmlns:a16="http://schemas.microsoft.com/office/drawing/2014/main" id="{F915858B-E330-594A-A550-D4B0AC80EBBA}"/>
-              </a:ext>
-            </a:extLst>
-          </p:cNvPr>
-          <p:cNvCxnSpPr>
-            <a:cxnSpLocks/>
-          </p:cNvCxnSpPr>
-          <p:nvPr/>
-        </p:nvCxnSpPr>
-        <p:spPr>
-          <a:xfrm>
-            <a:off x="5612522" y="3815256"/>
-            <a:ext cx="0" cy="515006"/>
-          </a:xfrm>
-          <a:prstGeom prst="line">
-            <a:avLst/>
-          </a:prstGeom>
-          <a:ln w="57150">
-            <a:solidFill>
-              <a:schemeClr val="tx2"/>
-            </a:solidFill>
-          </a:ln>
-        </p:spPr>
-        <p:style>
-          <a:lnRef idx="1">
-            <a:schemeClr val="accent1"/>
-          </a:lnRef>
-          <a:fillRef idx="0">
-            <a:schemeClr val="accent1"/>
-          </a:fillRef>
-          <a:effectRef idx="0">
-            <a:schemeClr val="accent1"/>
-          </a:effectRef>
-          <a:fontRef idx="minor">
-            <a:schemeClr val="tx1"/>
-          </a:fontRef>
-        </p:style>
-      </p:cxnSp>
       <p:sp>
         <p:nvSpPr>
           <p:cNvPr id="22" name="TextBox 21">
@@ -3836,7 +3658,7 @@
         </p:nvSpPr>
         <p:spPr>
           <a:xfrm>
-            <a:off x="4393320" y="1947070"/>
+            <a:off x="4939879" y="2588366"/>
             <a:ext cx="1156121" cy="646331"/>
           </a:xfrm>
           <a:prstGeom prst="rect">
@@ -3853,6 +3675,41 @@
             <a:r>
               <a:rPr lang="en-US" dirty="0"/>
               <a:t>Beam Aperture</a:t>
+            </a:r>
+          </a:p>
+        </p:txBody>
+      </p:sp>
+      <p:sp>
+        <p:nvSpPr>
+          <p:cNvPr id="15" name="TextBox 14">
+            <a:extLst>
+              <a:ext uri="{FF2B5EF4-FFF2-40B4-BE49-F238E27FC236}">
+                <a16:creationId xmlns:a16="http://schemas.microsoft.com/office/drawing/2014/main" id="{B276317F-3127-FC4D-A5A1-31849E6E9BFE}"/>
+              </a:ext>
+            </a:extLst>
+          </p:cNvPr>
+          <p:cNvSpPr txBox="1"/>
+          <p:nvPr/>
+        </p:nvSpPr>
+        <p:spPr>
+          <a:xfrm>
+            <a:off x="3705698" y="2107248"/>
+            <a:ext cx="1156121" cy="369332"/>
+          </a:xfrm>
+          <a:prstGeom prst="rect">
+            <a:avLst/>
+          </a:prstGeom>
+          <a:noFill/>
+        </p:spPr>
+        <p:txBody>
+          <a:bodyPr wrap="square" rtlCol="0">
+            <a:spAutoFit/>
+          </a:bodyPr>
+          <a:lstStyle/>
+          <a:p>
+            <a:r>
+              <a:rPr lang="en-US" dirty="0"/>
+              <a:t>Lens</a:t>
             </a:r>
           </a:p>
         </p:txBody>
@@ -3887,40 +3744,12 @@
           <a:chExt cx="0" cy="0"/>
         </a:xfrm>
       </p:grpSpPr>
-      <p:sp>
-        <p:nvSpPr>
-          <p:cNvPr id="2" name="Title 1">
-            <a:extLst>
-              <a:ext uri="{FF2B5EF4-FFF2-40B4-BE49-F238E27FC236}">
-                <a16:creationId xmlns:a16="http://schemas.microsoft.com/office/drawing/2014/main" id="{00A13936-2CBB-3142-9A50-FF74F5D6140D}"/>
-              </a:ext>
-            </a:extLst>
-          </p:cNvPr>
-          <p:cNvSpPr>
-            <a:spLocks noGrp="1"/>
-          </p:cNvSpPr>
-          <p:nvPr>
-            <p:ph type="title"/>
-          </p:nvPr>
-        </p:nvSpPr>
-        <p:spPr/>
-        <p:txBody>
-          <a:bodyPr/>
-          <a:lstStyle/>
-          <a:p>
-            <a:r>
-              <a:rPr lang="en-US" dirty="0"/>
-              <a:t>Monte Carlo Particle Trajectory Simulation</a:t>
-            </a:r>
-          </a:p>
-        </p:txBody>
-      </p:sp>
       <p:pic>
         <p:nvPicPr>
-          <p:cNvPr id="5" name="Picture 4" descr="A close up of a piece of paper&#10;&#10;Description automatically generated">
-            <a:extLst>
-              <a:ext uri="{FF2B5EF4-FFF2-40B4-BE49-F238E27FC236}">
-                <a16:creationId xmlns:a16="http://schemas.microsoft.com/office/drawing/2014/main" id="{29A64894-A5BF-834D-9EB7-29B42E98F32E}"/>
+          <p:cNvPr id="17" name="Picture 16" descr="A picture containing bed, umbrella&#10;&#10;Description automatically generated">
+            <a:extLst>
+              <a:ext uri="{FF2B5EF4-FFF2-40B4-BE49-F238E27FC236}">
+                <a16:creationId xmlns:a16="http://schemas.microsoft.com/office/drawing/2014/main" id="{B9886EB6-BD5D-724B-A6B9-E46F3D4B345D}"/>
               </a:ext>
             </a:extLst>
           </p:cNvPr>
@@ -3937,352 +3766,20 @@
         </p:blipFill>
         <p:spPr>
           <a:xfrm>
-            <a:off x="6274675" y="1884007"/>
-            <a:ext cx="5430815" cy="4073112"/>
+            <a:off x="567467" y="1914007"/>
+            <a:ext cx="5430818" cy="4073113"/>
           </a:xfrm>
           <a:prstGeom prst="rect">
             <a:avLst/>
           </a:prstGeom>
         </p:spPr>
       </p:pic>
-      <p:cxnSp>
-        <p:nvCxnSpPr>
-          <p:cNvPr id="6" name="Straight Connector 5">
-            <a:extLst>
-              <a:ext uri="{FF2B5EF4-FFF2-40B4-BE49-F238E27FC236}">
-                <a16:creationId xmlns:a16="http://schemas.microsoft.com/office/drawing/2014/main" id="{7D44EC60-1E3A-5D49-AD3E-6EC09AEF87AA}"/>
-              </a:ext>
-            </a:extLst>
-          </p:cNvPr>
-          <p:cNvCxnSpPr>
-            <a:cxnSpLocks/>
-          </p:cNvCxnSpPr>
-          <p:nvPr/>
-        </p:nvCxnSpPr>
-        <p:spPr>
-          <a:xfrm>
-            <a:off x="7626236" y="4908331"/>
-            <a:ext cx="0" cy="601718"/>
-          </a:xfrm>
-          <a:prstGeom prst="line">
-            <a:avLst/>
-          </a:prstGeom>
-          <a:ln w="57150">
-            <a:solidFill>
-              <a:schemeClr val="tx2">
-                <a:lumMod val="60000"/>
-                <a:lumOff val="40000"/>
-              </a:schemeClr>
-            </a:solidFill>
-          </a:ln>
-        </p:spPr>
-        <p:style>
-          <a:lnRef idx="1">
-            <a:schemeClr val="accent1"/>
-          </a:lnRef>
-          <a:fillRef idx="0">
-            <a:schemeClr val="accent1"/>
-          </a:fillRef>
-          <a:effectRef idx="0">
-            <a:schemeClr val="accent1"/>
-          </a:effectRef>
-          <a:fontRef idx="minor">
-            <a:schemeClr val="tx1"/>
-          </a:fontRef>
-        </p:style>
-      </p:cxnSp>
-      <p:cxnSp>
-        <p:nvCxnSpPr>
-          <p:cNvPr id="7" name="Straight Connector 6">
-            <a:extLst>
-              <a:ext uri="{FF2B5EF4-FFF2-40B4-BE49-F238E27FC236}">
-                <a16:creationId xmlns:a16="http://schemas.microsoft.com/office/drawing/2014/main" id="{B958D401-60C6-AF40-B926-F546895DDFBA}"/>
-              </a:ext>
-            </a:extLst>
-          </p:cNvPr>
-          <p:cNvCxnSpPr>
-            <a:cxnSpLocks/>
-          </p:cNvCxnSpPr>
-          <p:nvPr/>
-        </p:nvCxnSpPr>
-        <p:spPr>
-          <a:xfrm>
-            <a:off x="7626236" y="2363350"/>
-            <a:ext cx="0" cy="590057"/>
-          </a:xfrm>
-          <a:prstGeom prst="line">
-            <a:avLst/>
-          </a:prstGeom>
-          <a:ln w="57150">
-            <a:solidFill>
-              <a:schemeClr val="tx2">
-                <a:lumMod val="60000"/>
-                <a:lumOff val="40000"/>
-              </a:schemeClr>
-            </a:solidFill>
-          </a:ln>
-        </p:spPr>
-        <p:style>
-          <a:lnRef idx="1">
-            <a:schemeClr val="accent1"/>
-          </a:lnRef>
-          <a:fillRef idx="0">
-            <a:schemeClr val="accent1"/>
-          </a:fillRef>
-          <a:effectRef idx="0">
-            <a:schemeClr val="accent1"/>
-          </a:effectRef>
-          <a:fontRef idx="minor">
-            <a:schemeClr val="tx1"/>
-          </a:fontRef>
-        </p:style>
-      </p:cxnSp>
-      <p:cxnSp>
-        <p:nvCxnSpPr>
-          <p:cNvPr id="8" name="Straight Connector 7">
-            <a:extLst>
-              <a:ext uri="{FF2B5EF4-FFF2-40B4-BE49-F238E27FC236}">
-                <a16:creationId xmlns:a16="http://schemas.microsoft.com/office/drawing/2014/main" id="{5182000C-B93D-234B-80A7-40D8B4BB743C}"/>
-              </a:ext>
-            </a:extLst>
-          </p:cNvPr>
-          <p:cNvCxnSpPr>
-            <a:cxnSpLocks/>
-          </p:cNvCxnSpPr>
-          <p:nvPr/>
-        </p:nvCxnSpPr>
-        <p:spPr>
-          <a:xfrm>
-            <a:off x="9003087" y="5318234"/>
-            <a:ext cx="0" cy="191815"/>
-          </a:xfrm>
-          <a:prstGeom prst="line">
-            <a:avLst/>
-          </a:prstGeom>
-          <a:ln w="57150">
-            <a:solidFill>
-              <a:schemeClr val="tx2">
-                <a:lumMod val="60000"/>
-                <a:lumOff val="40000"/>
-              </a:schemeClr>
-            </a:solidFill>
-          </a:ln>
-        </p:spPr>
-        <p:style>
-          <a:lnRef idx="1">
-            <a:schemeClr val="accent1"/>
-          </a:lnRef>
-          <a:fillRef idx="0">
-            <a:schemeClr val="accent1"/>
-          </a:fillRef>
-          <a:effectRef idx="0">
-            <a:schemeClr val="accent1"/>
-          </a:effectRef>
-          <a:fontRef idx="minor">
-            <a:schemeClr val="tx1"/>
-          </a:fontRef>
-        </p:style>
-      </p:cxnSp>
-      <p:cxnSp>
-        <p:nvCxnSpPr>
-          <p:cNvPr id="9" name="Straight Connector 8">
-            <a:extLst>
-              <a:ext uri="{FF2B5EF4-FFF2-40B4-BE49-F238E27FC236}">
-                <a16:creationId xmlns:a16="http://schemas.microsoft.com/office/drawing/2014/main" id="{D2A104F2-E8D7-654F-A594-9513804948CA}"/>
-              </a:ext>
-            </a:extLst>
-          </p:cNvPr>
-          <p:cNvCxnSpPr>
-            <a:cxnSpLocks/>
-          </p:cNvCxnSpPr>
-          <p:nvPr/>
-        </p:nvCxnSpPr>
-        <p:spPr>
-          <a:xfrm>
-            <a:off x="8967285" y="2362611"/>
-            <a:ext cx="0" cy="186998"/>
-          </a:xfrm>
-          <a:prstGeom prst="line">
-            <a:avLst/>
-          </a:prstGeom>
-          <a:ln w="57150">
-            <a:solidFill>
-              <a:schemeClr val="tx2">
-                <a:lumMod val="60000"/>
-                <a:lumOff val="40000"/>
-              </a:schemeClr>
-            </a:solidFill>
-          </a:ln>
-        </p:spPr>
-        <p:style>
-          <a:lnRef idx="1">
-            <a:schemeClr val="accent1"/>
-          </a:lnRef>
-          <a:fillRef idx="0">
-            <a:schemeClr val="accent1"/>
-          </a:fillRef>
-          <a:effectRef idx="0">
-            <a:schemeClr val="accent1"/>
-          </a:effectRef>
-          <a:fontRef idx="minor">
-            <a:schemeClr val="tx1"/>
-          </a:fontRef>
-        </p:style>
-      </p:cxnSp>
-      <p:sp>
-        <p:nvSpPr>
-          <p:cNvPr id="10" name="TextBox 9">
-            <a:extLst>
-              <a:ext uri="{FF2B5EF4-FFF2-40B4-BE49-F238E27FC236}">
-                <a16:creationId xmlns:a16="http://schemas.microsoft.com/office/drawing/2014/main" id="{2089D110-A6F9-B54A-9C6C-D45DFEDBF39B}"/>
-              </a:ext>
-            </a:extLst>
-          </p:cNvPr>
-          <p:cNvSpPr txBox="1"/>
-          <p:nvPr/>
-        </p:nvSpPr>
-        <p:spPr>
-          <a:xfrm>
-            <a:off x="7630929" y="2362611"/>
-            <a:ext cx="1156121" cy="646331"/>
-          </a:xfrm>
-          <a:prstGeom prst="rect">
-            <a:avLst/>
-          </a:prstGeom>
-          <a:noFill/>
-        </p:spPr>
-        <p:txBody>
-          <a:bodyPr wrap="square" rtlCol="0">
-            <a:spAutoFit/>
-          </a:bodyPr>
-          <a:lstStyle/>
-          <a:p>
-            <a:r>
-              <a:rPr lang="en-US" dirty="0"/>
-              <a:t>4K Aperture</a:t>
-            </a:r>
-          </a:p>
-        </p:txBody>
-      </p:sp>
-      <p:sp>
-        <p:nvSpPr>
-          <p:cNvPr id="11" name="TextBox 10">
-            <a:extLst>
-              <a:ext uri="{FF2B5EF4-FFF2-40B4-BE49-F238E27FC236}">
-                <a16:creationId xmlns:a16="http://schemas.microsoft.com/office/drawing/2014/main" id="{89AA98FE-E52E-E749-B8AA-79D0F2442F7A}"/>
-              </a:ext>
-            </a:extLst>
-          </p:cNvPr>
-          <p:cNvSpPr txBox="1"/>
-          <p:nvPr/>
-        </p:nvSpPr>
-        <p:spPr>
-          <a:xfrm>
-            <a:off x="10016027" y="3681275"/>
-            <a:ext cx="1156121" cy="646331"/>
-          </a:xfrm>
-          <a:prstGeom prst="rect">
-            <a:avLst/>
-          </a:prstGeom>
-          <a:noFill/>
-        </p:spPr>
-        <p:txBody>
-          <a:bodyPr wrap="square" rtlCol="0">
-            <a:spAutoFit/>
-          </a:bodyPr>
-          <a:lstStyle/>
-          <a:p>
-            <a:r>
-              <a:rPr lang="en-US" dirty="0"/>
-              <a:t>MOT Region</a:t>
-            </a:r>
-          </a:p>
-        </p:txBody>
-      </p:sp>
-      <p:cxnSp>
-        <p:nvCxnSpPr>
-          <p:cNvPr id="12" name="Straight Connector 11">
-            <a:extLst>
-              <a:ext uri="{FF2B5EF4-FFF2-40B4-BE49-F238E27FC236}">
-                <a16:creationId xmlns:a16="http://schemas.microsoft.com/office/drawing/2014/main" id="{E53A8F12-F2C0-3044-9151-BEEC399EF162}"/>
-              </a:ext>
-            </a:extLst>
-          </p:cNvPr>
-          <p:cNvCxnSpPr>
-            <a:cxnSpLocks/>
-          </p:cNvCxnSpPr>
-          <p:nvPr/>
-        </p:nvCxnSpPr>
-        <p:spPr>
-          <a:xfrm>
-            <a:off x="10001573" y="3731174"/>
-            <a:ext cx="0" cy="522862"/>
-          </a:xfrm>
-          <a:prstGeom prst="line">
-            <a:avLst/>
-          </a:prstGeom>
-          <a:ln w="57150">
-            <a:solidFill>
-              <a:schemeClr val="tx2"/>
-            </a:solidFill>
-          </a:ln>
-        </p:spPr>
-        <p:style>
-          <a:lnRef idx="1">
-            <a:schemeClr val="accent1"/>
-          </a:lnRef>
-          <a:fillRef idx="0">
-            <a:schemeClr val="accent1"/>
-          </a:fillRef>
-          <a:effectRef idx="0">
-            <a:schemeClr val="accent1"/>
-          </a:effectRef>
-          <a:fontRef idx="minor">
-            <a:schemeClr val="tx1"/>
-          </a:fontRef>
-        </p:style>
-      </p:cxnSp>
-      <p:sp>
-        <p:nvSpPr>
-          <p:cNvPr id="13" name="TextBox 12">
-            <a:extLst>
-              <a:ext uri="{FF2B5EF4-FFF2-40B4-BE49-F238E27FC236}">
-                <a16:creationId xmlns:a16="http://schemas.microsoft.com/office/drawing/2014/main" id="{6C81A7D0-6FD6-5446-AD9A-8138687A21B0}"/>
-              </a:ext>
-            </a:extLst>
-          </p:cNvPr>
-          <p:cNvSpPr txBox="1"/>
-          <p:nvPr/>
-        </p:nvSpPr>
-        <p:spPr>
-          <a:xfrm>
-            <a:off x="8967285" y="2307076"/>
-            <a:ext cx="1156121" cy="646331"/>
-          </a:xfrm>
-          <a:prstGeom prst="rect">
-            <a:avLst/>
-          </a:prstGeom>
-          <a:noFill/>
-        </p:spPr>
-        <p:txBody>
-          <a:bodyPr wrap="square" rtlCol="0">
-            <a:spAutoFit/>
-          </a:bodyPr>
-          <a:lstStyle/>
-          <a:p>
-            <a:r>
-              <a:rPr lang="en-US" dirty="0"/>
-              <a:t>Beam Aperture</a:t>
-            </a:r>
-          </a:p>
-        </p:txBody>
-      </p:sp>
       <p:pic>
         <p:nvPicPr>
-          <p:cNvPr id="20" name="Picture 19" descr="A picture containing fruit&#10;&#10;Description automatically generated">
-            <a:extLst>
-              <a:ext uri="{FF2B5EF4-FFF2-40B4-BE49-F238E27FC236}">
-                <a16:creationId xmlns:a16="http://schemas.microsoft.com/office/drawing/2014/main" id="{E9A32A7C-1825-F749-9400-DFE8033C672B}"/>
+          <p:cNvPr id="4" name="Picture 3" descr="A screenshot of a cell phone&#10;&#10;Description automatically generated">
+            <a:extLst>
+              <a:ext uri="{FF2B5EF4-FFF2-40B4-BE49-F238E27FC236}">
+                <a16:creationId xmlns:a16="http://schemas.microsoft.com/office/drawing/2014/main" id="{CA16F88B-BE5F-504C-B7F8-E5C5235E92EA}"/>
               </a:ext>
             </a:extLst>
           </p:cNvPr>
@@ -4299,7 +3796,7 @@
         </p:blipFill>
         <p:spPr>
           <a:xfrm>
-            <a:off x="567467" y="1884006"/>
+            <a:off x="6193717" y="1884005"/>
             <a:ext cx="5430818" cy="4073113"/>
           </a:xfrm>
           <a:prstGeom prst="rect">
@@ -4309,10 +3806,38 @@
       </p:pic>
       <p:sp>
         <p:nvSpPr>
-          <p:cNvPr id="29" name="TextBox 28">
-            <a:extLst>
-              <a:ext uri="{FF2B5EF4-FFF2-40B4-BE49-F238E27FC236}">
-                <a16:creationId xmlns:a16="http://schemas.microsoft.com/office/drawing/2014/main" id="{B4E585F9-B62B-0640-AB60-ECB92A250B2C}"/>
+          <p:cNvPr id="2" name="Title 1">
+            <a:extLst>
+              <a:ext uri="{FF2B5EF4-FFF2-40B4-BE49-F238E27FC236}">
+                <a16:creationId xmlns:a16="http://schemas.microsoft.com/office/drawing/2014/main" id="{00A13936-2CBB-3142-9A50-FF74F5D6140D}"/>
+              </a:ext>
+            </a:extLst>
+          </p:cNvPr>
+          <p:cNvSpPr>
+            <a:spLocks noGrp="1"/>
+          </p:cNvSpPr>
+          <p:nvPr>
+            <p:ph type="title"/>
+          </p:nvPr>
+        </p:nvSpPr>
+        <p:spPr/>
+        <p:txBody>
+          <a:bodyPr/>
+          <a:lstStyle/>
+          <a:p>
+            <a:r>
+              <a:rPr lang="en-US" dirty="0"/>
+              <a:t>Monte Carlo Particle Trajectory Simulation</a:t>
+            </a:r>
+          </a:p>
+        </p:txBody>
+      </p:sp>
+      <p:sp>
+        <p:nvSpPr>
+          <p:cNvPr id="10" name="TextBox 9">
+            <a:extLst>
+              <a:ext uri="{FF2B5EF4-FFF2-40B4-BE49-F238E27FC236}">
+                <a16:creationId xmlns:a16="http://schemas.microsoft.com/office/drawing/2014/main" id="{2089D110-A6F9-B54A-9C6C-D45DFEDBF39B}"/>
               </a:ext>
             </a:extLst>
           </p:cNvPr>
@@ -4321,8 +3846,8 @@
         </p:nvSpPr>
         <p:spPr>
           <a:xfrm>
-            <a:off x="1987589" y="5957119"/>
-            <a:ext cx="2590574" cy="369332"/>
+            <a:off x="7540929" y="2835219"/>
+            <a:ext cx="1156121" cy="646331"/>
           </a:xfrm>
           <a:prstGeom prst="rect">
             <a:avLst/>
@@ -4335,20 +3860,19 @@
           </a:bodyPr>
           <a:lstStyle/>
           <a:p>
-            <a:pPr algn="ctr"/>
             <a:r>
               <a:rPr lang="en-US" dirty="0"/>
-              <a:t>Unpruned Trajectories</a:t>
-            </a:r>
-          </a:p>
-        </p:txBody>
-      </p:sp>
-      <p:sp>
-        <p:nvSpPr>
-          <p:cNvPr id="30" name="TextBox 29">
-            <a:extLst>
-              <a:ext uri="{FF2B5EF4-FFF2-40B4-BE49-F238E27FC236}">
-                <a16:creationId xmlns:a16="http://schemas.microsoft.com/office/drawing/2014/main" id="{A23158BE-AE7D-9C47-B7B8-510195309BBC}"/>
+              <a:t>4K Aperture</a:t>
+            </a:r>
+          </a:p>
+        </p:txBody>
+      </p:sp>
+      <p:sp>
+        <p:nvSpPr>
+          <p:cNvPr id="11" name="TextBox 10">
+            <a:extLst>
+              <a:ext uri="{FF2B5EF4-FFF2-40B4-BE49-F238E27FC236}">
+                <a16:creationId xmlns:a16="http://schemas.microsoft.com/office/drawing/2014/main" id="{89AA98FE-E52E-E749-B8AA-79D0F2442F7A}"/>
               </a:ext>
             </a:extLst>
           </p:cNvPr>
@@ -4357,8 +3881,8 @@
         </p:nvSpPr>
         <p:spPr>
           <a:xfrm>
-            <a:off x="8346556" y="5957119"/>
-            <a:ext cx="1467789" cy="369332"/>
+            <a:off x="9633707" y="3627399"/>
+            <a:ext cx="1156121" cy="646331"/>
           </a:xfrm>
           <a:prstGeom prst="rect">
             <a:avLst/>
@@ -4371,204 +3895,20 @@
           </a:bodyPr>
           <a:lstStyle/>
           <a:p>
-            <a:pPr algn="ctr"/>
+            <a:pPr algn="r"/>
             <a:r>
               <a:rPr lang="en-US" dirty="0"/>
-              <a:t>Without Lens</a:t>
-            </a:r>
-          </a:p>
-        </p:txBody>
-      </p:sp>
-      <p:cxnSp>
-        <p:nvCxnSpPr>
-          <p:cNvPr id="47" name="Straight Connector 46">
-            <a:extLst>
-              <a:ext uri="{FF2B5EF4-FFF2-40B4-BE49-F238E27FC236}">
-                <a16:creationId xmlns:a16="http://schemas.microsoft.com/office/drawing/2014/main" id="{0DA1DCB6-7124-0348-AC6A-CDEBC6DC4E93}"/>
-              </a:ext>
-            </a:extLst>
-          </p:cNvPr>
-          <p:cNvCxnSpPr>
-            <a:cxnSpLocks/>
-          </p:cNvCxnSpPr>
-          <p:nvPr/>
-        </p:nvCxnSpPr>
-        <p:spPr>
-          <a:xfrm>
-            <a:off x="1761464" y="4908331"/>
-            <a:ext cx="0" cy="601718"/>
-          </a:xfrm>
-          <a:prstGeom prst="line">
-            <a:avLst/>
-          </a:prstGeom>
-          <a:ln w="57150">
-            <a:solidFill>
-              <a:schemeClr val="tx2">
-                <a:lumMod val="60000"/>
-                <a:lumOff val="40000"/>
-              </a:schemeClr>
-            </a:solidFill>
-          </a:ln>
-        </p:spPr>
-        <p:style>
-          <a:lnRef idx="1">
-            <a:schemeClr val="accent1"/>
-          </a:lnRef>
-          <a:fillRef idx="0">
-            <a:schemeClr val="accent1"/>
-          </a:fillRef>
-          <a:effectRef idx="0">
-            <a:schemeClr val="accent1"/>
-          </a:effectRef>
-          <a:fontRef idx="minor">
-            <a:schemeClr val="tx1"/>
-          </a:fontRef>
-        </p:style>
-      </p:cxnSp>
-      <p:cxnSp>
-        <p:nvCxnSpPr>
-          <p:cNvPr id="48" name="Straight Connector 47">
-            <a:extLst>
-              <a:ext uri="{FF2B5EF4-FFF2-40B4-BE49-F238E27FC236}">
-                <a16:creationId xmlns:a16="http://schemas.microsoft.com/office/drawing/2014/main" id="{240C5905-F813-784A-962B-E01F2DC752FB}"/>
-              </a:ext>
-            </a:extLst>
-          </p:cNvPr>
-          <p:cNvCxnSpPr>
-            <a:cxnSpLocks/>
-          </p:cNvCxnSpPr>
-          <p:nvPr/>
-        </p:nvCxnSpPr>
-        <p:spPr>
-          <a:xfrm>
-            <a:off x="1761464" y="2363350"/>
-            <a:ext cx="0" cy="590057"/>
-          </a:xfrm>
-          <a:prstGeom prst="line">
-            <a:avLst/>
-          </a:prstGeom>
-          <a:ln w="57150">
-            <a:solidFill>
-              <a:schemeClr val="tx2">
-                <a:lumMod val="60000"/>
-                <a:lumOff val="40000"/>
-              </a:schemeClr>
-            </a:solidFill>
-          </a:ln>
-        </p:spPr>
-        <p:style>
-          <a:lnRef idx="1">
-            <a:schemeClr val="accent1"/>
-          </a:lnRef>
-          <a:fillRef idx="0">
-            <a:schemeClr val="accent1"/>
-          </a:fillRef>
-          <a:effectRef idx="0">
-            <a:schemeClr val="accent1"/>
-          </a:effectRef>
-          <a:fontRef idx="minor">
-            <a:schemeClr val="tx1"/>
-          </a:fontRef>
-        </p:style>
-      </p:cxnSp>
-      <p:cxnSp>
-        <p:nvCxnSpPr>
-          <p:cNvPr id="49" name="Straight Connector 48">
-            <a:extLst>
-              <a:ext uri="{FF2B5EF4-FFF2-40B4-BE49-F238E27FC236}">
-                <a16:creationId xmlns:a16="http://schemas.microsoft.com/office/drawing/2014/main" id="{922C3627-6FCC-AA43-A7E2-163956BC6E40}"/>
-              </a:ext>
-            </a:extLst>
-          </p:cNvPr>
-          <p:cNvCxnSpPr>
-            <a:cxnSpLocks/>
-          </p:cNvCxnSpPr>
-          <p:nvPr/>
-        </p:nvCxnSpPr>
-        <p:spPr>
-          <a:xfrm>
-            <a:off x="3127805" y="5318234"/>
-            <a:ext cx="0" cy="191815"/>
-          </a:xfrm>
-          <a:prstGeom prst="line">
-            <a:avLst/>
-          </a:prstGeom>
-          <a:ln w="57150">
-            <a:solidFill>
-              <a:schemeClr val="tx2">
-                <a:lumMod val="60000"/>
-                <a:lumOff val="40000"/>
-              </a:schemeClr>
-            </a:solidFill>
-          </a:ln>
-        </p:spPr>
-        <p:style>
-          <a:lnRef idx="1">
-            <a:schemeClr val="accent1"/>
-          </a:lnRef>
-          <a:fillRef idx="0">
-            <a:schemeClr val="accent1"/>
-          </a:fillRef>
-          <a:effectRef idx="0">
-            <a:schemeClr val="accent1"/>
-          </a:effectRef>
-          <a:fontRef idx="minor">
-            <a:schemeClr val="tx1"/>
-          </a:fontRef>
-        </p:style>
-      </p:cxnSp>
-      <p:cxnSp>
-        <p:nvCxnSpPr>
-          <p:cNvPr id="50" name="Straight Connector 49">
-            <a:extLst>
-              <a:ext uri="{FF2B5EF4-FFF2-40B4-BE49-F238E27FC236}">
-                <a16:creationId xmlns:a16="http://schemas.microsoft.com/office/drawing/2014/main" id="{B3E482F9-AB83-0E48-8CC0-C62E697D05B5}"/>
-              </a:ext>
-            </a:extLst>
-          </p:cNvPr>
-          <p:cNvCxnSpPr>
-            <a:cxnSpLocks/>
-          </p:cNvCxnSpPr>
-          <p:nvPr/>
-        </p:nvCxnSpPr>
-        <p:spPr>
-          <a:xfrm>
-            <a:off x="3144555" y="2362611"/>
-            <a:ext cx="0" cy="186998"/>
-          </a:xfrm>
-          <a:prstGeom prst="line">
-            <a:avLst/>
-          </a:prstGeom>
-          <a:ln w="57150">
-            <a:solidFill>
-              <a:schemeClr val="tx2">
-                <a:lumMod val="60000"/>
-                <a:lumOff val="40000"/>
-              </a:schemeClr>
-            </a:solidFill>
-          </a:ln>
-        </p:spPr>
-        <p:style>
-          <a:lnRef idx="1">
-            <a:schemeClr val="accent1"/>
-          </a:lnRef>
-          <a:fillRef idx="0">
-            <a:schemeClr val="accent1"/>
-          </a:fillRef>
-          <a:effectRef idx="0">
-            <a:schemeClr val="accent1"/>
-          </a:effectRef>
-          <a:fontRef idx="minor">
-            <a:schemeClr val="tx1"/>
-          </a:fontRef>
-        </p:style>
-      </p:cxnSp>
-      <p:sp>
-        <p:nvSpPr>
-          <p:cNvPr id="51" name="TextBox 50">
-            <a:extLst>
-              <a:ext uri="{FF2B5EF4-FFF2-40B4-BE49-F238E27FC236}">
-                <a16:creationId xmlns:a16="http://schemas.microsoft.com/office/drawing/2014/main" id="{0C1BF7AE-613C-664F-B10F-770A8EF029E8}"/>
+              <a:t>MOT Region</a:t>
+            </a:r>
+          </a:p>
+        </p:txBody>
+      </p:sp>
+      <p:sp>
+        <p:nvSpPr>
+          <p:cNvPr id="13" name="TextBox 12">
+            <a:extLst>
+              <a:ext uri="{FF2B5EF4-FFF2-40B4-BE49-F238E27FC236}">
+                <a16:creationId xmlns:a16="http://schemas.microsoft.com/office/drawing/2014/main" id="{6C81A7D0-6FD6-5446-AD9A-8138687A21B0}"/>
               </a:ext>
             </a:extLst>
           </p:cNvPr>
@@ -4577,7 +3917,7 @@
         </p:nvSpPr>
         <p:spPr>
           <a:xfrm>
-            <a:off x="1766157" y="2362611"/>
+            <a:off x="9402490" y="2643412"/>
             <a:ext cx="1156121" cy="646331"/>
           </a:xfrm>
           <a:prstGeom prst="rect">
@@ -4593,17 +3933,17 @@
           <a:p>
             <a:r>
               <a:rPr lang="en-US" dirty="0"/>
-              <a:t>4K Aperture</a:t>
-            </a:r>
-          </a:p>
-        </p:txBody>
-      </p:sp>
-      <p:sp>
-        <p:nvSpPr>
-          <p:cNvPr id="52" name="TextBox 51">
-            <a:extLst>
-              <a:ext uri="{FF2B5EF4-FFF2-40B4-BE49-F238E27FC236}">
-                <a16:creationId xmlns:a16="http://schemas.microsoft.com/office/drawing/2014/main" id="{7C62BDF3-F65A-EC45-AFCF-45C3524D67BB}"/>
+              <a:t>Beam Aperture</a:t>
+            </a:r>
+          </a:p>
+        </p:txBody>
+      </p:sp>
+      <p:sp>
+        <p:nvSpPr>
+          <p:cNvPr id="29" name="TextBox 28">
+            <a:extLst>
+              <a:ext uri="{FF2B5EF4-FFF2-40B4-BE49-F238E27FC236}">
+                <a16:creationId xmlns:a16="http://schemas.microsoft.com/office/drawing/2014/main" id="{B4E585F9-B62B-0640-AB60-ECB92A250B2C}"/>
               </a:ext>
             </a:extLst>
           </p:cNvPr>
@@ -4612,8 +3952,8 @@
         </p:nvSpPr>
         <p:spPr>
           <a:xfrm>
-            <a:off x="4161769" y="3639235"/>
-            <a:ext cx="1156121" cy="646331"/>
+            <a:off x="1987589" y="5957119"/>
+            <a:ext cx="2590574" cy="646331"/>
           </a:xfrm>
           <a:prstGeom prst="rect">
             <a:avLst/>
@@ -4626,62 +3966,20 @@
           </a:bodyPr>
           <a:lstStyle/>
           <a:p>
+            <a:pPr algn="ctr"/>
             <a:r>
               <a:rPr lang="en-US" dirty="0"/>
-              <a:t>MOT Region</a:t>
-            </a:r>
-          </a:p>
-        </p:txBody>
-      </p:sp>
-      <p:cxnSp>
-        <p:nvCxnSpPr>
-          <p:cNvPr id="53" name="Straight Connector 52">
-            <a:extLst>
-              <a:ext uri="{FF2B5EF4-FFF2-40B4-BE49-F238E27FC236}">
-                <a16:creationId xmlns:a16="http://schemas.microsoft.com/office/drawing/2014/main" id="{F09CF453-1E94-6745-9321-4F2F881A636F}"/>
-              </a:ext>
-            </a:extLst>
-          </p:cNvPr>
-          <p:cNvCxnSpPr>
-            <a:cxnSpLocks/>
-          </p:cNvCxnSpPr>
-          <p:nvPr/>
-        </p:nvCxnSpPr>
-        <p:spPr>
-          <a:xfrm>
-            <a:off x="4136805" y="3699644"/>
-            <a:ext cx="0" cy="522862"/>
-          </a:xfrm>
-          <a:prstGeom prst="line">
-            <a:avLst/>
-          </a:prstGeom>
-          <a:ln w="57150">
-            <a:solidFill>
-              <a:schemeClr val="tx2"/>
-            </a:solidFill>
-          </a:ln>
-        </p:spPr>
-        <p:style>
-          <a:lnRef idx="1">
-            <a:schemeClr val="accent1"/>
-          </a:lnRef>
-          <a:fillRef idx="0">
-            <a:schemeClr val="accent1"/>
-          </a:fillRef>
-          <a:effectRef idx="0">
-            <a:schemeClr val="accent1"/>
-          </a:effectRef>
-          <a:fontRef idx="minor">
-            <a:schemeClr val="tx1"/>
-          </a:fontRef>
-        </p:style>
-      </p:cxnSp>
-      <p:sp>
-        <p:nvSpPr>
-          <p:cNvPr id="54" name="TextBox 53">
-            <a:extLst>
-              <a:ext uri="{FF2B5EF4-FFF2-40B4-BE49-F238E27FC236}">
-                <a16:creationId xmlns:a16="http://schemas.microsoft.com/office/drawing/2014/main" id="{21685D39-8ED0-1942-BF04-C4384FA5EA59}"/>
+              <a:t>Unpruned Trajectories, With Lens</a:t>
+            </a:r>
+          </a:p>
+        </p:txBody>
+      </p:sp>
+      <p:sp>
+        <p:nvSpPr>
+          <p:cNvPr id="30" name="TextBox 29">
+            <a:extLst>
+              <a:ext uri="{FF2B5EF4-FFF2-40B4-BE49-F238E27FC236}">
+                <a16:creationId xmlns:a16="http://schemas.microsoft.com/office/drawing/2014/main" id="{A23158BE-AE7D-9C47-B7B8-510195309BBC}"/>
               </a:ext>
             </a:extLst>
           </p:cNvPr>
@@ -4690,8 +3988,8 @@
         </p:nvSpPr>
         <p:spPr>
           <a:xfrm>
-            <a:off x="3144555" y="2307076"/>
-            <a:ext cx="1156121" cy="646331"/>
+            <a:off x="8346556" y="5957119"/>
+            <a:ext cx="1467789" cy="369332"/>
           </a:xfrm>
           <a:prstGeom prst="rect">
             <a:avLst/>
@@ -4704,9 +4002,186 @@
           </a:bodyPr>
           <a:lstStyle/>
           <a:p>
+            <a:pPr algn="ctr"/>
+            <a:r>
+              <a:rPr lang="en-US" dirty="0"/>
+              <a:t>Without Lens</a:t>
+            </a:r>
+          </a:p>
+        </p:txBody>
+      </p:sp>
+      <p:sp>
+        <p:nvSpPr>
+          <p:cNvPr id="51" name="TextBox 50">
+            <a:extLst>
+              <a:ext uri="{FF2B5EF4-FFF2-40B4-BE49-F238E27FC236}">
+                <a16:creationId xmlns:a16="http://schemas.microsoft.com/office/drawing/2014/main" id="{0C1BF7AE-613C-664F-B10F-770A8EF029E8}"/>
+              </a:ext>
+            </a:extLst>
+          </p:cNvPr>
+          <p:cNvSpPr txBox="1"/>
+          <p:nvPr/>
+        </p:nvSpPr>
+        <p:spPr>
+          <a:xfrm>
+            <a:off x="1931732" y="2695399"/>
+            <a:ext cx="1156121" cy="646331"/>
+          </a:xfrm>
+          <a:prstGeom prst="rect">
+            <a:avLst/>
+          </a:prstGeom>
+          <a:noFill/>
+        </p:spPr>
+        <p:txBody>
+          <a:bodyPr wrap="square" rtlCol="0">
+            <a:spAutoFit/>
+          </a:bodyPr>
+          <a:lstStyle/>
+          <a:p>
+            <a:r>
+              <a:rPr lang="en-US" dirty="0"/>
+              <a:t>4K Aperture</a:t>
+            </a:r>
+          </a:p>
+        </p:txBody>
+      </p:sp>
+      <p:sp>
+        <p:nvSpPr>
+          <p:cNvPr id="25" name="TextBox 24">
+            <a:extLst>
+              <a:ext uri="{FF2B5EF4-FFF2-40B4-BE49-F238E27FC236}">
+                <a16:creationId xmlns:a16="http://schemas.microsoft.com/office/drawing/2014/main" id="{A09C6CA3-B5D2-F844-BE8A-85D1C68F7EB8}"/>
+              </a:ext>
+            </a:extLst>
+          </p:cNvPr>
+          <p:cNvSpPr txBox="1"/>
+          <p:nvPr/>
+        </p:nvSpPr>
+        <p:spPr>
+          <a:xfrm>
+            <a:off x="8403396" y="2333917"/>
+            <a:ext cx="1156121" cy="369332"/>
+          </a:xfrm>
+          <a:prstGeom prst="rect">
+            <a:avLst/>
+          </a:prstGeom>
+          <a:noFill/>
+        </p:spPr>
+        <p:txBody>
+          <a:bodyPr wrap="square" rtlCol="0">
+            <a:spAutoFit/>
+          </a:bodyPr>
+          <a:lstStyle/>
+          <a:p>
+            <a:r>
+              <a:rPr lang="en-US" dirty="0"/>
+              <a:t>Lens</a:t>
+            </a:r>
+          </a:p>
+        </p:txBody>
+      </p:sp>
+      <p:sp>
+        <p:nvSpPr>
+          <p:cNvPr id="26" name="TextBox 25">
+            <a:extLst>
+              <a:ext uri="{FF2B5EF4-FFF2-40B4-BE49-F238E27FC236}">
+                <a16:creationId xmlns:a16="http://schemas.microsoft.com/office/drawing/2014/main" id="{656A2D31-59DE-B74B-A415-87EB2F29DB65}"/>
+              </a:ext>
+            </a:extLst>
+          </p:cNvPr>
+          <p:cNvSpPr txBox="1"/>
+          <p:nvPr/>
+        </p:nvSpPr>
+        <p:spPr>
+          <a:xfrm>
+            <a:off x="3744921" y="2663943"/>
+            <a:ext cx="1156121" cy="646331"/>
+          </a:xfrm>
+          <a:prstGeom prst="rect">
+            <a:avLst/>
+          </a:prstGeom>
+          <a:noFill/>
+        </p:spPr>
+        <p:txBody>
+          <a:bodyPr wrap="square" rtlCol="0">
+            <a:spAutoFit/>
+          </a:bodyPr>
+          <a:lstStyle/>
+          <a:p>
             <a:r>
               <a:rPr lang="en-US" dirty="0"/>
               <a:t>Beam Aperture</a:t>
+            </a:r>
+          </a:p>
+        </p:txBody>
+      </p:sp>
+      <p:sp>
+        <p:nvSpPr>
+          <p:cNvPr id="27" name="TextBox 26">
+            <a:extLst>
+              <a:ext uri="{FF2B5EF4-FFF2-40B4-BE49-F238E27FC236}">
+                <a16:creationId xmlns:a16="http://schemas.microsoft.com/office/drawing/2014/main" id="{F46F151A-D1E6-C44A-A165-32AD0CF9726E}"/>
+              </a:ext>
+            </a:extLst>
+          </p:cNvPr>
+          <p:cNvSpPr txBox="1"/>
+          <p:nvPr/>
+        </p:nvSpPr>
+        <p:spPr>
+          <a:xfrm>
+            <a:off x="2777357" y="2369634"/>
+            <a:ext cx="1156121" cy="369332"/>
+          </a:xfrm>
+          <a:prstGeom prst="rect">
+            <a:avLst/>
+          </a:prstGeom>
+          <a:noFill/>
+        </p:spPr>
+        <p:txBody>
+          <a:bodyPr wrap="square" rtlCol="0">
+            <a:spAutoFit/>
+          </a:bodyPr>
+          <a:lstStyle/>
+          <a:p>
+            <a:r>
+              <a:rPr lang="en-US" dirty="0"/>
+              <a:t>Lens</a:t>
+            </a:r>
+          </a:p>
+        </p:txBody>
+      </p:sp>
+      <p:sp>
+        <p:nvSpPr>
+          <p:cNvPr id="33" name="TextBox 32">
+            <a:extLst>
+              <a:ext uri="{FF2B5EF4-FFF2-40B4-BE49-F238E27FC236}">
+                <a16:creationId xmlns:a16="http://schemas.microsoft.com/office/drawing/2014/main" id="{33909E01-2A98-854C-827F-F533D540FFB8}"/>
+              </a:ext>
+            </a:extLst>
+          </p:cNvPr>
+          <p:cNvSpPr txBox="1"/>
+          <p:nvPr/>
+        </p:nvSpPr>
+        <p:spPr>
+          <a:xfrm>
+            <a:off x="3979141" y="3648419"/>
+            <a:ext cx="1156121" cy="646331"/>
+          </a:xfrm>
+          <a:prstGeom prst="rect">
+            <a:avLst/>
+          </a:prstGeom>
+          <a:noFill/>
+        </p:spPr>
+        <p:txBody>
+          <a:bodyPr wrap="square" rtlCol="0">
+            <a:spAutoFit/>
+          </a:bodyPr>
+          <a:lstStyle/>
+          <a:p>
+            <a:pPr algn="r"/>
+            <a:r>
+              <a:rPr lang="en-US" dirty="0"/>
+              <a:t>MOT Region</a:t>
             </a:r>
           </a:p>
         </p:txBody>
@@ -4725,6 +4200,235 @@
 </file>
 
 <file path=ppt/slides/slide12.xml><?xml version="1.0" encoding="utf-8"?>
+<p:sld xmlns:a="http://schemas.openxmlformats.org/drawingml/2006/main" xmlns:r="http://schemas.openxmlformats.org/officeDocument/2006/relationships" xmlns:p="http://schemas.openxmlformats.org/presentationml/2006/main">
+  <p:cSld>
+    <p:spTree>
+      <p:nvGrpSpPr>
+        <p:cNvPr id="1" name=""/>
+        <p:cNvGrpSpPr/>
+        <p:nvPr/>
+      </p:nvGrpSpPr>
+      <p:grpSpPr>
+        <a:xfrm>
+          <a:off x="0" y="0"/>
+          <a:ext cx="0" cy="0"/>
+          <a:chOff x="0" y="0"/>
+          <a:chExt cx="0" cy="0"/>
+        </a:xfrm>
+      </p:grpSpPr>
+      <p:pic>
+        <p:nvPicPr>
+          <p:cNvPr id="17" name="Picture 16">
+            <a:extLst>
+              <a:ext uri="{FF2B5EF4-FFF2-40B4-BE49-F238E27FC236}">
+                <a16:creationId xmlns:a16="http://schemas.microsoft.com/office/drawing/2014/main" id="{B9886EB6-BD5D-724B-A6B9-E46F3D4B345D}"/>
+              </a:ext>
+            </a:extLst>
+          </p:cNvPr>
+          <p:cNvPicPr>
+            <a:picLocks noChangeAspect="1"/>
+          </p:cNvPicPr>
+          <p:nvPr/>
+        </p:nvPicPr>
+        <p:blipFill>
+          <a:blip r:embed="rId2"/>
+          <a:srcRect/>
+          <a:stretch/>
+        </p:blipFill>
+        <p:spPr>
+          <a:xfrm>
+            <a:off x="2404464" y="1304242"/>
+            <a:ext cx="6550349" cy="4912762"/>
+          </a:xfrm>
+          <a:prstGeom prst="rect">
+            <a:avLst/>
+          </a:prstGeom>
+        </p:spPr>
+      </p:pic>
+      <p:sp>
+        <p:nvSpPr>
+          <p:cNvPr id="2" name="Title 1">
+            <a:extLst>
+              <a:ext uri="{FF2B5EF4-FFF2-40B4-BE49-F238E27FC236}">
+                <a16:creationId xmlns:a16="http://schemas.microsoft.com/office/drawing/2014/main" id="{00A13936-2CBB-3142-9A50-FF74F5D6140D}"/>
+              </a:ext>
+            </a:extLst>
+          </p:cNvPr>
+          <p:cNvSpPr>
+            <a:spLocks noGrp="1"/>
+          </p:cNvSpPr>
+          <p:nvPr>
+            <p:ph type="title"/>
+          </p:nvPr>
+        </p:nvSpPr>
+        <p:spPr/>
+        <p:txBody>
+          <a:bodyPr/>
+          <a:lstStyle/>
+          <a:p>
+            <a:r>
+              <a:rPr lang="en-US" dirty="0"/>
+              <a:t>Monte Carlo Particle Trajectory Simulation</a:t>
+            </a:r>
+          </a:p>
+        </p:txBody>
+      </p:sp>
+      <p:sp>
+        <p:nvSpPr>
+          <p:cNvPr id="29" name="TextBox 28">
+            <a:extLst>
+              <a:ext uri="{FF2B5EF4-FFF2-40B4-BE49-F238E27FC236}">
+                <a16:creationId xmlns:a16="http://schemas.microsoft.com/office/drawing/2014/main" id="{B4E585F9-B62B-0640-AB60-ECB92A250B2C}"/>
+              </a:ext>
+            </a:extLst>
+          </p:cNvPr>
+          <p:cNvSpPr txBox="1"/>
+          <p:nvPr/>
+        </p:nvSpPr>
+        <p:spPr>
+          <a:xfrm>
+            <a:off x="4384351" y="6264266"/>
+            <a:ext cx="2590574" cy="369332"/>
+          </a:xfrm>
+          <a:prstGeom prst="rect">
+            <a:avLst/>
+          </a:prstGeom>
+          <a:noFill/>
+        </p:spPr>
+        <p:txBody>
+          <a:bodyPr wrap="square" rtlCol="0">
+            <a:spAutoFit/>
+          </a:bodyPr>
+          <a:lstStyle/>
+          <a:p>
+            <a:pPr algn="ctr"/>
+            <a:r>
+              <a:rPr lang="en-US" dirty="0"/>
+              <a:t>Magnified, With Lens</a:t>
+            </a:r>
+          </a:p>
+        </p:txBody>
+      </p:sp>
+      <p:sp>
+        <p:nvSpPr>
+          <p:cNvPr id="51" name="TextBox 50">
+            <a:extLst>
+              <a:ext uri="{FF2B5EF4-FFF2-40B4-BE49-F238E27FC236}">
+                <a16:creationId xmlns:a16="http://schemas.microsoft.com/office/drawing/2014/main" id="{0C1BF7AE-613C-664F-B10F-770A8EF029E8}"/>
+              </a:ext>
+            </a:extLst>
+          </p:cNvPr>
+          <p:cNvSpPr txBox="1"/>
+          <p:nvPr/>
+        </p:nvSpPr>
+        <p:spPr>
+          <a:xfrm>
+            <a:off x="4086352" y="1920414"/>
+            <a:ext cx="1156121" cy="646331"/>
+          </a:xfrm>
+          <a:prstGeom prst="rect">
+            <a:avLst/>
+          </a:prstGeom>
+          <a:noFill/>
+        </p:spPr>
+        <p:txBody>
+          <a:bodyPr wrap="square" rtlCol="0">
+            <a:spAutoFit/>
+          </a:bodyPr>
+          <a:lstStyle/>
+          <a:p>
+            <a:r>
+              <a:rPr lang="en-US" dirty="0"/>
+              <a:t>4K Aperture</a:t>
+            </a:r>
+          </a:p>
+        </p:txBody>
+      </p:sp>
+      <p:sp>
+        <p:nvSpPr>
+          <p:cNvPr id="26" name="TextBox 25">
+            <a:extLst>
+              <a:ext uri="{FF2B5EF4-FFF2-40B4-BE49-F238E27FC236}">
+                <a16:creationId xmlns:a16="http://schemas.microsoft.com/office/drawing/2014/main" id="{656A2D31-59DE-B74B-A415-87EB2F29DB65}"/>
+              </a:ext>
+            </a:extLst>
+          </p:cNvPr>
+          <p:cNvSpPr txBox="1"/>
+          <p:nvPr/>
+        </p:nvSpPr>
+        <p:spPr>
+          <a:xfrm>
+            <a:off x="6256894" y="1907969"/>
+            <a:ext cx="1156121" cy="646331"/>
+          </a:xfrm>
+          <a:prstGeom prst="rect">
+            <a:avLst/>
+          </a:prstGeom>
+          <a:noFill/>
+        </p:spPr>
+        <p:txBody>
+          <a:bodyPr wrap="square" rtlCol="0">
+            <a:spAutoFit/>
+          </a:bodyPr>
+          <a:lstStyle/>
+          <a:p>
+            <a:r>
+              <a:rPr lang="en-US" dirty="0"/>
+              <a:t>Beam Aperture</a:t>
+            </a:r>
+          </a:p>
+        </p:txBody>
+      </p:sp>
+      <p:sp>
+        <p:nvSpPr>
+          <p:cNvPr id="33" name="TextBox 32">
+            <a:extLst>
+              <a:ext uri="{FF2B5EF4-FFF2-40B4-BE49-F238E27FC236}">
+                <a16:creationId xmlns:a16="http://schemas.microsoft.com/office/drawing/2014/main" id="{33909E01-2A98-854C-827F-F533D540FFB8}"/>
+              </a:ext>
+            </a:extLst>
+          </p:cNvPr>
+          <p:cNvSpPr txBox="1"/>
+          <p:nvPr/>
+        </p:nvSpPr>
+        <p:spPr>
+          <a:xfrm>
+            <a:off x="6722337" y="3472397"/>
+            <a:ext cx="1156121" cy="646331"/>
+          </a:xfrm>
+          <a:prstGeom prst="rect">
+            <a:avLst/>
+          </a:prstGeom>
+          <a:noFill/>
+        </p:spPr>
+        <p:txBody>
+          <a:bodyPr wrap="square" rtlCol="0">
+            <a:spAutoFit/>
+          </a:bodyPr>
+          <a:lstStyle/>
+          <a:p>
+            <a:pPr algn="r"/>
+            <a:r>
+              <a:rPr lang="en-US" dirty="0"/>
+              <a:t>MOT Region</a:t>
+            </a:r>
+          </a:p>
+        </p:txBody>
+      </p:sp>
+    </p:spTree>
+    <p:extLst>
+      <p:ext uri="{BB962C8B-B14F-4D97-AF65-F5344CB8AC3E}">
+        <p14:creationId xmlns:p14="http://schemas.microsoft.com/office/powerpoint/2010/main" val="599864585"/>
+      </p:ext>
+    </p:extLst>
+  </p:cSld>
+  <p:clrMapOvr>
+    <a:masterClrMapping/>
+  </p:clrMapOvr>
+</p:sld>
+</file>
+
+<file path=ppt/slides/slide13.xml><?xml version="1.0" encoding="utf-8"?>
 <p:sld xmlns:a="http://schemas.openxmlformats.org/drawingml/2006/main" xmlns:r="http://schemas.openxmlformats.org/officeDocument/2006/relationships" xmlns:p="http://schemas.openxmlformats.org/presentationml/2006/main">
   <p:cSld>
     <p:spTree>
@@ -5509,10 +5213,10 @@
       </p:sp>
       <p:pic>
         <p:nvPicPr>
-          <p:cNvPr id="5" name="Picture 4">
-            <a:extLst>
-              <a:ext uri="{FF2B5EF4-FFF2-40B4-BE49-F238E27FC236}">
-                <a16:creationId xmlns:a16="http://schemas.microsoft.com/office/drawing/2014/main" id="{C39C4654-319C-C34E-8B3F-CA701C1F0199}"/>
+          <p:cNvPr id="3" name="Picture 2">
+            <a:extLst>
+              <a:ext uri="{FF2B5EF4-FFF2-40B4-BE49-F238E27FC236}">
+                <a16:creationId xmlns:a16="http://schemas.microsoft.com/office/drawing/2014/main" id="{3A2332CA-E753-704C-BD17-912A7E081D8E}"/>
               </a:ext>
             </a:extLst>
           </p:cNvPr>
@@ -5529,8 +5233,8 @@
         </p:blipFill>
         <p:spPr>
           <a:xfrm>
-            <a:off x="6096000" y="1690688"/>
-            <a:ext cx="5842000" cy="4381500"/>
+            <a:off x="601663" y="1550756"/>
+            <a:ext cx="4673600" cy="4631400"/>
           </a:xfrm>
           <a:prstGeom prst="rect">
             <a:avLst/>
@@ -5539,10 +5243,10 @@
       </p:pic>
       <p:pic>
         <p:nvPicPr>
-          <p:cNvPr id="4" name="Picture 3" descr="A close up of text on a white surface&#10;&#10;Description automatically generated">
-            <a:extLst>
-              <a:ext uri="{FF2B5EF4-FFF2-40B4-BE49-F238E27FC236}">
-                <a16:creationId xmlns:a16="http://schemas.microsoft.com/office/drawing/2014/main" id="{C29D9ADE-5600-B343-85D0-E28C517672AC}"/>
+          <p:cNvPr id="7" name="Picture 6" descr="A close up of text on a white background&#10;&#10;Description automatically generated">
+            <a:extLst>
+              <a:ext uri="{FF2B5EF4-FFF2-40B4-BE49-F238E27FC236}">
+                <a16:creationId xmlns:a16="http://schemas.microsoft.com/office/drawing/2014/main" id="{23C2246F-EDD3-3746-9BAA-FA09AF8A0D03}"/>
               </a:ext>
             </a:extLst>
           </p:cNvPr>
@@ -5559,8 +5263,8 @@
         </p:blipFill>
         <p:spPr>
           <a:xfrm>
-            <a:off x="130627" y="1690688"/>
-            <a:ext cx="5842000" cy="4381500"/>
+            <a:off x="5275263" y="1212488"/>
+            <a:ext cx="6626225" cy="4969668"/>
           </a:xfrm>
           <a:prstGeom prst="rect">
             <a:avLst/>
@@ -5627,10 +5331,10 @@
       </p:sp>
       <p:pic>
         <p:nvPicPr>
-          <p:cNvPr id="6" name="Picture 5" descr="A close up of a map&#10;&#10;Description automatically generated">
-            <a:extLst>
-              <a:ext uri="{FF2B5EF4-FFF2-40B4-BE49-F238E27FC236}">
-                <a16:creationId xmlns:a16="http://schemas.microsoft.com/office/drawing/2014/main" id="{CC9CC33F-4AD6-9D4E-BDAA-D3E209CDDEAF}"/>
+          <p:cNvPr id="4" name="Picture 3" descr="A close up of a piece of paper&#10;&#10;Description automatically generated">
+            <a:extLst>
+              <a:ext uri="{FF2B5EF4-FFF2-40B4-BE49-F238E27FC236}">
+                <a16:creationId xmlns:a16="http://schemas.microsoft.com/office/drawing/2014/main" id="{95BB7397-A589-C14A-86FF-80040614A233}"/>
               </a:ext>
             </a:extLst>
           </p:cNvPr>
@@ -5647,8 +5351,8 @@
         </p:blipFill>
         <p:spPr>
           <a:xfrm>
-            <a:off x="2722617" y="1432801"/>
-            <a:ext cx="6746765" cy="5060074"/>
+            <a:off x="2482849" y="1238250"/>
+            <a:ext cx="7226301" cy="5419726"/>
           </a:xfrm>
           <a:prstGeom prst="rect">
             <a:avLst/>
@@ -6449,7 +6153,7 @@
               <a:p>
                 <a:r>
                   <a:rPr lang="en-US" dirty="0"/>
-                  <a:t>Time of flight: 0.01 s, 3000 timesteps</a:t>
+                  <a:t>Time of flight: 0.02 s, 3000 timesteps</a:t>
                 </a:r>
               </a:p>
               <a:p>
@@ -6484,37 +6188,37 @@
                       <a:rPr lang="en-US" b="0" i="1" dirty="0" smtClean="0">
                         <a:latin typeface="Cambria Math" panose="02040503050406030204" pitchFamily="18" charset="0"/>
                       </a:rPr>
-                      <m:t>: </m:t>
+                      <m:t>:</m:t>
                     </m:r>
                     <m:r>
-                      <a:rPr lang="en-US" i="1" dirty="0" smtClean="0">
+                      <a:rPr lang="en-US" i="1" dirty="0">
                         <a:latin typeface="Cambria Math" panose="02040503050406030204" pitchFamily="18" charset="0"/>
                       </a:rPr>
-                      <m:t> </m:t>
+                      <m:t>𝜇</m:t>
+                    </m:r>
+                    <m:r>
+                      <a:rPr lang="en-US" i="1" dirty="0">
+                        <a:latin typeface="Cambria Math" panose="02040503050406030204" pitchFamily="18" charset="0"/>
+                      </a:rPr>
+                      <m:t>=100.</m:t>
                     </m:r>
                     <m:r>
                       <a:rPr lang="en-US" b="0" i="1" dirty="0" smtClean="0">
                         <a:latin typeface="Cambria Math" panose="02040503050406030204" pitchFamily="18" charset="0"/>
                       </a:rPr>
-                      <m:t>𝜎</m:t>
-                    </m:r>
-                    <m:r>
-                      <a:rPr lang="en-US" b="0" i="1" dirty="0" smtClean="0">
-                        <a:latin typeface="Cambria Math" panose="02040503050406030204" pitchFamily="18" charset="0"/>
-                      </a:rPr>
-                      <m:t>=100.0</m:t>
+                      <m:t>0</m:t>
                     </m:r>
                     <m:f>
                       <m:fPr>
                         <m:ctrlPr>
-                          <a:rPr lang="en-US" b="0" i="1" dirty="0" smtClean="0">
+                          <a:rPr lang="en-US" i="1" dirty="0">
                             <a:latin typeface="Cambria Math" panose="02040503050406030204" pitchFamily="18" charset="0"/>
                           </a:rPr>
                         </m:ctrlPr>
                       </m:fPr>
                       <m:num>
                         <m:r>
-                          <a:rPr lang="en-US" b="0" i="1" dirty="0" smtClean="0">
+                          <a:rPr lang="en-US" i="1" dirty="0">
                             <a:latin typeface="Cambria Math" panose="02040503050406030204" pitchFamily="18" charset="0"/>
                           </a:rPr>
                           <m:t>𝑚</m:t>
@@ -6522,7 +6226,7 @@
                       </m:num>
                       <m:den>
                         <m:r>
-                          <a:rPr lang="en-US" b="0" i="1" dirty="0" smtClean="0">
+                          <a:rPr lang="en-US" i="1" dirty="0">
                             <a:latin typeface="Cambria Math" panose="02040503050406030204" pitchFamily="18" charset="0"/>
                           </a:rPr>
                           <m:t>𝑠</m:t>
@@ -6539,13 +6243,13 @@
                       <a:rPr lang="en-US" b="0" i="1" dirty="0" smtClean="0">
                         <a:latin typeface="Cambria Math" panose="02040503050406030204" pitchFamily="18" charset="0"/>
                       </a:rPr>
-                      <m:t>𝜇</m:t>
+                      <m:t>𝜎</m:t>
                     </m:r>
                     <m:r>
                       <a:rPr lang="en-US" b="0" i="1" dirty="0" smtClean="0">
                         <a:latin typeface="Cambria Math" panose="02040503050406030204" pitchFamily="18" charset="0"/>
                       </a:rPr>
-                      <m:t>=10.0</m:t>
+                      <m:t>=30.0</m:t>
                     </m:r>
                     <m:f>
                       <m:fPr>
@@ -6604,6 +6308,30 @@
                       <m:t>:</m:t>
                     </m:r>
                     <m:r>
+                      <a:rPr lang="en-US" i="1">
+                        <a:latin typeface="Cambria Math" panose="02040503050406030204" pitchFamily="18" charset="0"/>
+                      </a:rPr>
+                      <m:t>𝜇</m:t>
+                    </m:r>
+                    <m:r>
+                      <a:rPr lang="en-US" i="1">
+                        <a:latin typeface="Cambria Math" panose="02040503050406030204" pitchFamily="18" charset="0"/>
+                      </a:rPr>
+                      <m:t>=0 </m:t>
+                    </m:r>
+                    <m:r>
+                      <a:rPr lang="en-US" i="1">
+                        <a:latin typeface="Cambria Math" panose="02040503050406030204" pitchFamily="18" charset="0"/>
+                      </a:rPr>
+                      <m:t>𝑚𝑚</m:t>
+                    </m:r>
+                    <m:r>
+                      <a:rPr lang="en-US" b="0" i="0" smtClean="0">
+                        <a:latin typeface="Cambria Math" panose="02040503050406030204" pitchFamily="18" charset="0"/>
+                      </a:rPr>
+                      <m:t>, </m:t>
+                    </m:r>
+                    <m:r>
                       <a:rPr lang="en-US" b="0" i="1" smtClean="0">
                         <a:latin typeface="Cambria Math" panose="02040503050406030204" pitchFamily="18" charset="0"/>
                       </a:rPr>
@@ -6614,30 +6342,6 @@
                         <a:latin typeface="Cambria Math" panose="02040503050406030204" pitchFamily="18" charset="0"/>
                       </a:rPr>
                       <m:t>=5 </m:t>
-                    </m:r>
-                    <m:r>
-                      <a:rPr lang="en-US" b="0" i="1" smtClean="0">
-                        <a:latin typeface="Cambria Math" panose="02040503050406030204" pitchFamily="18" charset="0"/>
-                      </a:rPr>
-                      <m:t>𝑚𝑚</m:t>
-                    </m:r>
-                    <m:r>
-                      <a:rPr lang="en-US" b="0" i="1" smtClean="0">
-                        <a:latin typeface="Cambria Math" panose="02040503050406030204" pitchFamily="18" charset="0"/>
-                      </a:rPr>
-                      <m:t>, </m:t>
-                    </m:r>
-                    <m:r>
-                      <a:rPr lang="en-US" b="0" i="1" smtClean="0">
-                        <a:latin typeface="Cambria Math" panose="02040503050406030204" pitchFamily="18" charset="0"/>
-                      </a:rPr>
-                      <m:t>𝜇</m:t>
-                    </m:r>
-                    <m:r>
-                      <a:rPr lang="en-US" b="0" i="1" smtClean="0">
-                        <a:latin typeface="Cambria Math" panose="02040503050406030204" pitchFamily="18" charset="0"/>
-                      </a:rPr>
-                      <m:t>=0 </m:t>
                     </m:r>
                     <m:r>
                       <a:rPr lang="en-US" b="0" i="1" smtClean="0">

</xml_diff>